<commit_message>
Modifiquei o logo do pptx
</commit_message>
<xml_diff>
--- a/Documentacao/StoryBoard_KPRunnin'.pptx
+++ b/Documentacao/StoryBoard_KPRunnin'.pptx
@@ -3187,6 +3187,42 @@
           </a:p>
         </p:txBody>
       </p:sp>
+      <p:pic>
+        <p:nvPicPr>
+          <p:cNvPr id="11" name="Imagem 10">
+            <a:extLst>
+              <a:ext uri="{FF2B5EF4-FFF2-40B4-BE49-F238E27FC236}">
+                <a16:creationId xmlns:a16="http://schemas.microsoft.com/office/drawing/2014/main" id="{4A73C3C7-B5D8-4B07-B9D6-E0685211ACFE}"/>
+              </a:ext>
+            </a:extLst>
+          </p:cNvPr>
+          <p:cNvPicPr>
+            <a:picLocks noChangeAspect="1"/>
+          </p:cNvPicPr>
+          <p:nvPr/>
+        </p:nvPicPr>
+        <p:blipFill>
+          <a:blip r:embed="rId2">
+            <a:extLst>
+              <a:ext uri="{28A0092B-C50C-407E-A947-70E740481C1C}">
+                <a14:useLocalDpi xmlns:a14="http://schemas.microsoft.com/office/drawing/2010/main" val="0"/>
+              </a:ext>
+            </a:extLst>
+          </a:blip>
+          <a:stretch>
+            <a:fillRect/>
+          </a:stretch>
+        </p:blipFill>
+        <p:spPr>
+          <a:xfrm>
+            <a:off x="3406587" y="2172915"/>
+            <a:ext cx="1596014" cy="1596014"/>
+          </a:xfrm>
+          <a:prstGeom prst="rect">
+            <a:avLst/>
+          </a:prstGeom>
+        </p:spPr>
+      </p:pic>
       <p:sp>
         <p:nvSpPr>
           <p:cNvPr id="8" name="CaixaDeTexto 7">
@@ -3263,53 +3299,42 @@
           </a:p>
         </p:txBody>
       </p:sp>
-      <p:sp>
-        <p:nvSpPr>
-          <p:cNvPr id="2" name="CaixaDeTexto 1">
-            <a:extLst>
-              <a:ext uri="{FF2B5EF4-FFF2-40B4-BE49-F238E27FC236}">
-                <a16:creationId xmlns:a16="http://schemas.microsoft.com/office/drawing/2014/main" id="{404153EB-9038-4060-9099-26972FFBA4AF}"/>
-              </a:ext>
-            </a:extLst>
-          </p:cNvPr>
-          <p:cNvSpPr txBox="1"/>
-          <p:nvPr/>
-        </p:nvSpPr>
-        <p:spPr>
-          <a:xfrm>
-            <a:off x="4408098" y="2107721"/>
-            <a:ext cx="2743200" cy="1569660"/>
-          </a:xfrm>
-          <a:prstGeom prst="rect">
-            <a:avLst/>
-          </a:prstGeom>
-          <a:noFill/>
-        </p:spPr>
-        <p:txBody>
-          <a:bodyPr rot="0" spcFirstLastPara="0" vertOverflow="overflow" horzOverflow="overflow" vert="horz" wrap="square" lIns="91440" tIns="45720" rIns="91440" bIns="45720" numCol="1" spcCol="0" rtlCol="0" fromWordArt="0" anchor="t" anchorCtr="0" forceAA="0" compatLnSpc="1">
-            <a:prstTxWarp prst="textNoShape">
-              <a:avLst/>
-            </a:prstTxWarp>
-            <a:spAutoFit/>
-          </a:bodyPr>
-          <a:lstStyle/>
-          <a:p>
-            <a:pPr algn="l"/>
-            <a:r>
-              <a:rPr lang="pt-BR" sz="9600" i="1" dirty="0">
-                <a:latin typeface="PMingLiU-ExtB"/>
-                <a:ea typeface="PMingLiU-ExtB"/>
-              </a:rPr>
-              <a:t>KPR</a:t>
-            </a:r>
-            <a:endParaRPr lang="pt-BR" sz="9600" i="1">
-              <a:latin typeface="PMingLiU-ExtB"/>
-              <a:ea typeface="PMingLiU-ExtB"/>
-              <a:cs typeface="Calibri"/>
-            </a:endParaRPr>
-          </a:p>
-        </p:txBody>
-      </p:sp>
+      <p:pic>
+        <p:nvPicPr>
+          <p:cNvPr id="13" name="Imagem 12">
+            <a:extLst>
+              <a:ext uri="{FF2B5EF4-FFF2-40B4-BE49-F238E27FC236}">
+                <a16:creationId xmlns:a16="http://schemas.microsoft.com/office/drawing/2014/main" id="{E741D897-D77E-4B03-8341-D23046F5B7F0}"/>
+              </a:ext>
+            </a:extLst>
+          </p:cNvPr>
+          <p:cNvPicPr>
+            <a:picLocks noChangeAspect="1"/>
+          </p:cNvPicPr>
+          <p:nvPr/>
+        </p:nvPicPr>
+        <p:blipFill>
+          <a:blip r:embed="rId3" cstate="print">
+            <a:extLst>
+              <a:ext uri="{28A0092B-C50C-407E-A947-70E740481C1C}">
+                <a14:useLocalDpi xmlns:a14="http://schemas.microsoft.com/office/drawing/2010/main" val="0"/>
+              </a:ext>
+            </a:extLst>
+          </a:blip>
+          <a:stretch>
+            <a:fillRect/>
+          </a:stretch>
+        </p:blipFill>
+        <p:spPr>
+          <a:xfrm>
+            <a:off x="5214705" y="2473710"/>
+            <a:ext cx="2895625" cy="1053686"/>
+          </a:xfrm>
+          <a:prstGeom prst="rect">
+            <a:avLst/>
+          </a:prstGeom>
+        </p:spPr>
+      </p:pic>
     </p:spTree>
     <p:extLst>
       <p:ext uri="{BB962C8B-B14F-4D97-AF65-F5344CB8AC3E}">
@@ -3606,47 +3631,78 @@
           </a:prstGeom>
         </p:spPr>
       </p:pic>
-      <p:sp>
-        <p:nvSpPr>
-          <p:cNvPr id="2" name="CaixaDeTexto 1">
-            <a:extLst>
-              <a:ext uri="{FF2B5EF4-FFF2-40B4-BE49-F238E27FC236}">
-                <a16:creationId xmlns:a16="http://schemas.microsoft.com/office/drawing/2014/main" id="{764B4ED7-8E24-4DB2-ABA7-8709A1083C3A}"/>
-              </a:ext>
-            </a:extLst>
-          </p:cNvPr>
-          <p:cNvSpPr txBox="1"/>
-          <p:nvPr/>
-        </p:nvSpPr>
-        <p:spPr>
-          <a:xfrm>
-            <a:off x="425570" y="253042"/>
-            <a:ext cx="2743200" cy="369332"/>
-          </a:xfrm>
-          <a:prstGeom prst="rect">
-            <a:avLst/>
-          </a:prstGeom>
-          <a:noFill/>
-        </p:spPr>
-        <p:txBody>
-          <a:bodyPr rot="0" spcFirstLastPara="0" vertOverflow="overflow" horzOverflow="overflow" vert="horz" wrap="square" lIns="91440" tIns="45720" rIns="91440" bIns="45720" numCol="1" spcCol="0" rtlCol="0" fromWordArt="0" anchor="t" anchorCtr="0" forceAA="0" compatLnSpc="1">
-            <a:prstTxWarp prst="textNoShape">
-              <a:avLst/>
-            </a:prstTxWarp>
-            <a:spAutoFit/>
-          </a:bodyPr>
-          <a:lstStyle/>
-          <a:p>
-            <a:r>
-              <a:rPr lang="pt-BR" i="1">
-                <a:latin typeface="PMingLiU-ExtB"/>
-              </a:rPr>
-              <a:t>KPR</a:t>
-            </a:r>
-            <a:endParaRPr lang="pt-BR"/>
-          </a:p>
-        </p:txBody>
-      </p:sp>
+      <p:pic>
+        <p:nvPicPr>
+          <p:cNvPr id="11" name="Imagem 10">
+            <a:extLst>
+              <a:ext uri="{FF2B5EF4-FFF2-40B4-BE49-F238E27FC236}">
+                <a16:creationId xmlns:a16="http://schemas.microsoft.com/office/drawing/2014/main" id="{FCCEFDB5-E597-43D6-B8B6-793E4851790F}"/>
+              </a:ext>
+            </a:extLst>
+          </p:cNvPr>
+          <p:cNvPicPr>
+            <a:picLocks noChangeAspect="1"/>
+          </p:cNvPicPr>
+          <p:nvPr/>
+        </p:nvPicPr>
+        <p:blipFill>
+          <a:blip r:embed="rId7" cstate="print">
+            <a:extLst>
+              <a:ext uri="{28A0092B-C50C-407E-A947-70E740481C1C}">
+                <a14:useLocalDpi xmlns:a14="http://schemas.microsoft.com/office/drawing/2010/main" val="0"/>
+              </a:ext>
+            </a:extLst>
+          </a:blip>
+          <a:stretch>
+            <a:fillRect/>
+          </a:stretch>
+        </p:blipFill>
+        <p:spPr>
+          <a:xfrm>
+            <a:off x="234640" y="251302"/>
+            <a:ext cx="276347" cy="276347"/>
+          </a:xfrm>
+          <a:prstGeom prst="rect">
+            <a:avLst/>
+          </a:prstGeom>
+        </p:spPr>
+      </p:pic>
+      <p:pic>
+        <p:nvPicPr>
+          <p:cNvPr id="13" name="Imagem 12">
+            <a:extLst>
+              <a:ext uri="{FF2B5EF4-FFF2-40B4-BE49-F238E27FC236}">
+                <a16:creationId xmlns:a16="http://schemas.microsoft.com/office/drawing/2014/main" id="{B3E1DC22-AE4A-462E-B1BD-870E117AE79D}"/>
+              </a:ext>
+            </a:extLst>
+          </p:cNvPr>
+          <p:cNvPicPr>
+            <a:picLocks noChangeAspect="1"/>
+          </p:cNvPicPr>
+          <p:nvPr/>
+        </p:nvPicPr>
+        <p:blipFill>
+          <a:blip r:embed="rId8" cstate="print">
+            <a:extLst>
+              <a:ext uri="{28A0092B-C50C-407E-A947-70E740481C1C}">
+                <a14:useLocalDpi xmlns:a14="http://schemas.microsoft.com/office/drawing/2010/main" val="0"/>
+              </a:ext>
+            </a:extLst>
+          </a:blip>
+          <a:stretch>
+            <a:fillRect/>
+          </a:stretch>
+        </p:blipFill>
+        <p:spPr>
+          <a:xfrm>
+            <a:off x="564125" y="303308"/>
+            <a:ext cx="662913" cy="241227"/>
+          </a:xfrm>
+          <a:prstGeom prst="rect">
+            <a:avLst/>
+          </a:prstGeom>
+        </p:spPr>
+      </p:pic>
     </p:spTree>
     <p:extLst>
       <p:ext uri="{BB962C8B-B14F-4D97-AF65-F5344CB8AC3E}">
@@ -4058,47 +4114,78 @@
           </a:prstGeom>
         </p:spPr>
       </p:pic>
-      <p:sp>
-        <p:nvSpPr>
-          <p:cNvPr id="2" name="CaixaDeTexto 1">
-            <a:extLst>
-              <a:ext uri="{FF2B5EF4-FFF2-40B4-BE49-F238E27FC236}">
-                <a16:creationId xmlns:a16="http://schemas.microsoft.com/office/drawing/2014/main" id="{32463F4C-2A54-45F7-9DF8-AED75A469189}"/>
-              </a:ext>
-            </a:extLst>
-          </p:cNvPr>
-          <p:cNvSpPr txBox="1"/>
-          <p:nvPr/>
-        </p:nvSpPr>
-        <p:spPr>
-          <a:xfrm>
-            <a:off x="439947" y="253042"/>
-            <a:ext cx="2743200" cy="369332"/>
-          </a:xfrm>
-          <a:prstGeom prst="rect">
-            <a:avLst/>
-          </a:prstGeom>
-          <a:noFill/>
-        </p:spPr>
-        <p:txBody>
-          <a:bodyPr rot="0" spcFirstLastPara="0" vertOverflow="overflow" horzOverflow="overflow" vert="horz" wrap="square" lIns="91440" tIns="45720" rIns="91440" bIns="45720" numCol="1" spcCol="0" rtlCol="0" fromWordArt="0" anchor="t" anchorCtr="0" forceAA="0" compatLnSpc="1">
-            <a:prstTxWarp prst="textNoShape">
-              <a:avLst/>
-            </a:prstTxWarp>
-            <a:spAutoFit/>
-          </a:bodyPr>
-          <a:lstStyle/>
-          <a:p>
-            <a:r>
-              <a:rPr lang="pt-BR" i="1">
-                <a:latin typeface="PMingLiU-ExtB"/>
-              </a:rPr>
-              <a:t>KPR</a:t>
-            </a:r>
-            <a:endParaRPr lang="pt-BR"/>
-          </a:p>
-        </p:txBody>
-      </p:sp>
+      <p:pic>
+        <p:nvPicPr>
+          <p:cNvPr id="15" name="Imagem 14">
+            <a:extLst>
+              <a:ext uri="{FF2B5EF4-FFF2-40B4-BE49-F238E27FC236}">
+                <a16:creationId xmlns:a16="http://schemas.microsoft.com/office/drawing/2014/main" id="{74F6FD10-1814-4084-B79C-464A7ED2E07E}"/>
+              </a:ext>
+            </a:extLst>
+          </p:cNvPr>
+          <p:cNvPicPr>
+            <a:picLocks noChangeAspect="1"/>
+          </p:cNvPicPr>
+          <p:nvPr/>
+        </p:nvPicPr>
+        <p:blipFill>
+          <a:blip r:embed="rId12" cstate="print">
+            <a:extLst>
+              <a:ext uri="{28A0092B-C50C-407E-A947-70E740481C1C}">
+                <a14:useLocalDpi xmlns:a14="http://schemas.microsoft.com/office/drawing/2010/main" val="0"/>
+              </a:ext>
+            </a:extLst>
+          </a:blip>
+          <a:stretch>
+            <a:fillRect/>
+          </a:stretch>
+        </p:blipFill>
+        <p:spPr>
+          <a:xfrm>
+            <a:off x="234640" y="251302"/>
+            <a:ext cx="276347" cy="276347"/>
+          </a:xfrm>
+          <a:prstGeom prst="rect">
+            <a:avLst/>
+          </a:prstGeom>
+        </p:spPr>
+      </p:pic>
+      <p:pic>
+        <p:nvPicPr>
+          <p:cNvPr id="18" name="Imagem 17">
+            <a:extLst>
+              <a:ext uri="{FF2B5EF4-FFF2-40B4-BE49-F238E27FC236}">
+                <a16:creationId xmlns:a16="http://schemas.microsoft.com/office/drawing/2014/main" id="{01518E4D-2183-462C-BAA4-B7DC1D9AFA07}"/>
+              </a:ext>
+            </a:extLst>
+          </p:cNvPr>
+          <p:cNvPicPr>
+            <a:picLocks noChangeAspect="1"/>
+          </p:cNvPicPr>
+          <p:nvPr/>
+        </p:nvPicPr>
+        <p:blipFill>
+          <a:blip r:embed="rId13" cstate="print">
+            <a:extLst>
+              <a:ext uri="{28A0092B-C50C-407E-A947-70E740481C1C}">
+                <a14:useLocalDpi xmlns:a14="http://schemas.microsoft.com/office/drawing/2010/main" val="0"/>
+              </a:ext>
+            </a:extLst>
+          </a:blip>
+          <a:stretch>
+            <a:fillRect/>
+          </a:stretch>
+        </p:blipFill>
+        <p:spPr>
+          <a:xfrm>
+            <a:off x="564125" y="303308"/>
+            <a:ext cx="662913" cy="241227"/>
+          </a:xfrm>
+          <a:prstGeom prst="rect">
+            <a:avLst/>
+          </a:prstGeom>
+        </p:spPr>
+      </p:pic>
     </p:spTree>
     <p:extLst>
       <p:ext uri="{BB962C8B-B14F-4D97-AF65-F5344CB8AC3E}">
@@ -4474,47 +4561,78 @@
           </a:prstGeom>
         </p:spPr>
       </p:pic>
-      <p:sp>
-        <p:nvSpPr>
-          <p:cNvPr id="2" name="CaixaDeTexto 1">
-            <a:extLst>
-              <a:ext uri="{FF2B5EF4-FFF2-40B4-BE49-F238E27FC236}">
-                <a16:creationId xmlns:a16="http://schemas.microsoft.com/office/drawing/2014/main" id="{7814C90B-D6CF-4730-A666-335D21A02B97}"/>
-              </a:ext>
-            </a:extLst>
-          </p:cNvPr>
-          <p:cNvSpPr txBox="1"/>
-          <p:nvPr/>
-        </p:nvSpPr>
-        <p:spPr>
-          <a:xfrm>
-            <a:off x="425570" y="253042"/>
-            <a:ext cx="2743200" cy="369332"/>
-          </a:xfrm>
-          <a:prstGeom prst="rect">
-            <a:avLst/>
-          </a:prstGeom>
-          <a:noFill/>
-        </p:spPr>
-        <p:txBody>
-          <a:bodyPr rot="0" spcFirstLastPara="0" vertOverflow="overflow" horzOverflow="overflow" vert="horz" wrap="square" lIns="91440" tIns="45720" rIns="91440" bIns="45720" numCol="1" spcCol="0" rtlCol="0" fromWordArt="0" anchor="t" anchorCtr="0" forceAA="0" compatLnSpc="1">
-            <a:prstTxWarp prst="textNoShape">
-              <a:avLst/>
-            </a:prstTxWarp>
-            <a:spAutoFit/>
-          </a:bodyPr>
-          <a:lstStyle/>
-          <a:p>
-            <a:r>
-              <a:rPr lang="pt-BR" i="1">
-                <a:latin typeface="PMingLiU-ExtB"/>
-              </a:rPr>
-              <a:t>KPR</a:t>
-            </a:r>
-            <a:endParaRPr lang="pt-BR"/>
-          </a:p>
-        </p:txBody>
-      </p:sp>
+      <p:pic>
+        <p:nvPicPr>
+          <p:cNvPr id="13" name="Imagem 12">
+            <a:extLst>
+              <a:ext uri="{FF2B5EF4-FFF2-40B4-BE49-F238E27FC236}">
+                <a16:creationId xmlns:a16="http://schemas.microsoft.com/office/drawing/2014/main" id="{A4944088-1702-45AA-A075-39EFCB1BB404}"/>
+              </a:ext>
+            </a:extLst>
+          </p:cNvPr>
+          <p:cNvPicPr>
+            <a:picLocks noChangeAspect="1"/>
+          </p:cNvPicPr>
+          <p:nvPr/>
+        </p:nvPicPr>
+        <p:blipFill>
+          <a:blip r:embed="rId6" cstate="print">
+            <a:extLst>
+              <a:ext uri="{28A0092B-C50C-407E-A947-70E740481C1C}">
+                <a14:useLocalDpi xmlns:a14="http://schemas.microsoft.com/office/drawing/2010/main" val="0"/>
+              </a:ext>
+            </a:extLst>
+          </a:blip>
+          <a:stretch>
+            <a:fillRect/>
+          </a:stretch>
+        </p:blipFill>
+        <p:spPr>
+          <a:xfrm>
+            <a:off x="234640" y="251302"/>
+            <a:ext cx="276347" cy="276347"/>
+          </a:xfrm>
+          <a:prstGeom prst="rect">
+            <a:avLst/>
+          </a:prstGeom>
+        </p:spPr>
+      </p:pic>
+      <p:pic>
+        <p:nvPicPr>
+          <p:cNvPr id="15" name="Imagem 14">
+            <a:extLst>
+              <a:ext uri="{FF2B5EF4-FFF2-40B4-BE49-F238E27FC236}">
+                <a16:creationId xmlns:a16="http://schemas.microsoft.com/office/drawing/2014/main" id="{4BE8FAB4-63FC-4C89-9FAF-29375B906A72}"/>
+              </a:ext>
+            </a:extLst>
+          </p:cNvPr>
+          <p:cNvPicPr>
+            <a:picLocks noChangeAspect="1"/>
+          </p:cNvPicPr>
+          <p:nvPr/>
+        </p:nvPicPr>
+        <p:blipFill>
+          <a:blip r:embed="rId7" cstate="print">
+            <a:extLst>
+              <a:ext uri="{28A0092B-C50C-407E-A947-70E740481C1C}">
+                <a14:useLocalDpi xmlns:a14="http://schemas.microsoft.com/office/drawing/2010/main" val="0"/>
+              </a:ext>
+            </a:extLst>
+          </a:blip>
+          <a:stretch>
+            <a:fillRect/>
+          </a:stretch>
+        </p:blipFill>
+        <p:spPr>
+          <a:xfrm>
+            <a:off x="564125" y="303308"/>
+            <a:ext cx="662913" cy="241227"/>
+          </a:xfrm>
+          <a:prstGeom prst="rect">
+            <a:avLst/>
+          </a:prstGeom>
+        </p:spPr>
+      </p:pic>
     </p:spTree>
     <p:extLst>
       <p:ext uri="{BB962C8B-B14F-4D97-AF65-F5344CB8AC3E}">
@@ -4857,47 +4975,78 @@
           </a:prstGeom>
         </p:spPr>
       </p:pic>
-      <p:sp>
-        <p:nvSpPr>
-          <p:cNvPr id="3" name="CaixaDeTexto 2">
-            <a:extLst>
-              <a:ext uri="{FF2B5EF4-FFF2-40B4-BE49-F238E27FC236}">
-                <a16:creationId xmlns:a16="http://schemas.microsoft.com/office/drawing/2014/main" id="{D6902FFE-6847-4912-BCEC-68671BBD9910}"/>
-              </a:ext>
-            </a:extLst>
-          </p:cNvPr>
-          <p:cNvSpPr txBox="1"/>
-          <p:nvPr/>
-        </p:nvSpPr>
-        <p:spPr>
-          <a:xfrm>
-            <a:off x="439947" y="238664"/>
-            <a:ext cx="2743200" cy="369332"/>
-          </a:xfrm>
-          <a:prstGeom prst="rect">
-            <a:avLst/>
-          </a:prstGeom>
-          <a:noFill/>
-        </p:spPr>
-        <p:txBody>
-          <a:bodyPr rot="0" spcFirstLastPara="0" vertOverflow="overflow" horzOverflow="overflow" vert="horz" wrap="square" lIns="91440" tIns="45720" rIns="91440" bIns="45720" numCol="1" spcCol="0" rtlCol="0" fromWordArt="0" anchor="t" anchorCtr="0" forceAA="0" compatLnSpc="1">
-            <a:prstTxWarp prst="textNoShape">
-              <a:avLst/>
-            </a:prstTxWarp>
-            <a:spAutoFit/>
-          </a:bodyPr>
-          <a:lstStyle/>
-          <a:p>
-            <a:r>
-              <a:rPr lang="pt-BR" i="1">
-                <a:latin typeface="PMingLiU-ExtB"/>
-              </a:rPr>
-              <a:t>KPR</a:t>
-            </a:r>
-            <a:endParaRPr lang="pt-BR"/>
-          </a:p>
-        </p:txBody>
-      </p:sp>
+      <p:pic>
+        <p:nvPicPr>
+          <p:cNvPr id="15" name="Imagem 14">
+            <a:extLst>
+              <a:ext uri="{FF2B5EF4-FFF2-40B4-BE49-F238E27FC236}">
+                <a16:creationId xmlns:a16="http://schemas.microsoft.com/office/drawing/2014/main" id="{75465CFC-8F10-4AE8-A6CE-E5FC1311CD67}"/>
+              </a:ext>
+            </a:extLst>
+          </p:cNvPr>
+          <p:cNvPicPr>
+            <a:picLocks noChangeAspect="1"/>
+          </p:cNvPicPr>
+          <p:nvPr/>
+        </p:nvPicPr>
+        <p:blipFill>
+          <a:blip r:embed="rId9" cstate="print">
+            <a:extLst>
+              <a:ext uri="{28A0092B-C50C-407E-A947-70E740481C1C}">
+                <a14:useLocalDpi xmlns:a14="http://schemas.microsoft.com/office/drawing/2010/main" val="0"/>
+              </a:ext>
+            </a:extLst>
+          </a:blip>
+          <a:stretch>
+            <a:fillRect/>
+          </a:stretch>
+        </p:blipFill>
+        <p:spPr>
+          <a:xfrm>
+            <a:off x="234640" y="251302"/>
+            <a:ext cx="276347" cy="276347"/>
+          </a:xfrm>
+          <a:prstGeom prst="rect">
+            <a:avLst/>
+          </a:prstGeom>
+        </p:spPr>
+      </p:pic>
+      <p:pic>
+        <p:nvPicPr>
+          <p:cNvPr id="16" name="Imagem 15">
+            <a:extLst>
+              <a:ext uri="{FF2B5EF4-FFF2-40B4-BE49-F238E27FC236}">
+                <a16:creationId xmlns:a16="http://schemas.microsoft.com/office/drawing/2014/main" id="{6EAC00C8-E109-4123-BDC1-EEE0DEB0D5CF}"/>
+              </a:ext>
+            </a:extLst>
+          </p:cNvPr>
+          <p:cNvPicPr>
+            <a:picLocks noChangeAspect="1"/>
+          </p:cNvPicPr>
+          <p:nvPr/>
+        </p:nvPicPr>
+        <p:blipFill>
+          <a:blip r:embed="rId10" cstate="print">
+            <a:extLst>
+              <a:ext uri="{28A0092B-C50C-407E-A947-70E740481C1C}">
+                <a14:useLocalDpi xmlns:a14="http://schemas.microsoft.com/office/drawing/2010/main" val="0"/>
+              </a:ext>
+            </a:extLst>
+          </a:blip>
+          <a:stretch>
+            <a:fillRect/>
+          </a:stretch>
+        </p:blipFill>
+        <p:spPr>
+          <a:xfrm>
+            <a:off x="564125" y="303308"/>
+            <a:ext cx="662913" cy="241227"/>
+          </a:xfrm>
+          <a:prstGeom prst="rect">
+            <a:avLst/>
+          </a:prstGeom>
+        </p:spPr>
+      </p:pic>
     </p:spTree>
     <p:extLst>
       <p:ext uri="{BB962C8B-B14F-4D97-AF65-F5344CB8AC3E}">
@@ -5193,47 +5342,78 @@
           </a:prstGeom>
         </p:spPr>
       </p:pic>
-      <p:sp>
-        <p:nvSpPr>
-          <p:cNvPr id="4" name="CaixaDeTexto 3">
-            <a:extLst>
-              <a:ext uri="{FF2B5EF4-FFF2-40B4-BE49-F238E27FC236}">
-                <a16:creationId xmlns:a16="http://schemas.microsoft.com/office/drawing/2014/main" id="{20CA5A66-0DEE-4EC9-B905-7E5660789D5B}"/>
-              </a:ext>
-            </a:extLst>
-          </p:cNvPr>
-          <p:cNvSpPr txBox="1"/>
-          <p:nvPr/>
-        </p:nvSpPr>
-        <p:spPr>
-          <a:xfrm>
-            <a:off x="425570" y="238664"/>
-            <a:ext cx="2743200" cy="369332"/>
-          </a:xfrm>
-          <a:prstGeom prst="rect">
-            <a:avLst/>
-          </a:prstGeom>
-          <a:noFill/>
-        </p:spPr>
-        <p:txBody>
-          <a:bodyPr rot="0" spcFirstLastPara="0" vertOverflow="overflow" horzOverflow="overflow" vert="horz" wrap="square" lIns="91440" tIns="45720" rIns="91440" bIns="45720" numCol="1" spcCol="0" rtlCol="0" fromWordArt="0" anchor="t" anchorCtr="0" forceAA="0" compatLnSpc="1">
-            <a:prstTxWarp prst="textNoShape">
-              <a:avLst/>
-            </a:prstTxWarp>
-            <a:spAutoFit/>
-          </a:bodyPr>
-          <a:lstStyle/>
-          <a:p>
-            <a:r>
-              <a:rPr lang="pt-BR" i="1">
-                <a:latin typeface="PMingLiU-ExtB"/>
-              </a:rPr>
-              <a:t>KPR</a:t>
-            </a:r>
-            <a:endParaRPr lang="pt-BR"/>
-          </a:p>
-        </p:txBody>
-      </p:sp>
+      <p:pic>
+        <p:nvPicPr>
+          <p:cNvPr id="11" name="Imagem 10">
+            <a:extLst>
+              <a:ext uri="{FF2B5EF4-FFF2-40B4-BE49-F238E27FC236}">
+                <a16:creationId xmlns:a16="http://schemas.microsoft.com/office/drawing/2014/main" id="{567DCC46-0E09-4308-B6C6-816115731803}"/>
+              </a:ext>
+            </a:extLst>
+          </p:cNvPr>
+          <p:cNvPicPr>
+            <a:picLocks noChangeAspect="1"/>
+          </p:cNvPicPr>
+          <p:nvPr/>
+        </p:nvPicPr>
+        <p:blipFill>
+          <a:blip r:embed="rId7" cstate="print">
+            <a:extLst>
+              <a:ext uri="{28A0092B-C50C-407E-A947-70E740481C1C}">
+                <a14:useLocalDpi xmlns:a14="http://schemas.microsoft.com/office/drawing/2010/main" val="0"/>
+              </a:ext>
+            </a:extLst>
+          </a:blip>
+          <a:stretch>
+            <a:fillRect/>
+          </a:stretch>
+        </p:blipFill>
+        <p:spPr>
+          <a:xfrm>
+            <a:off x="234640" y="251302"/>
+            <a:ext cx="276347" cy="276347"/>
+          </a:xfrm>
+          <a:prstGeom prst="rect">
+            <a:avLst/>
+          </a:prstGeom>
+        </p:spPr>
+      </p:pic>
+      <p:pic>
+        <p:nvPicPr>
+          <p:cNvPr id="15" name="Imagem 14">
+            <a:extLst>
+              <a:ext uri="{FF2B5EF4-FFF2-40B4-BE49-F238E27FC236}">
+                <a16:creationId xmlns:a16="http://schemas.microsoft.com/office/drawing/2014/main" id="{70F69D6D-3C6C-4011-9B17-81F008306796}"/>
+              </a:ext>
+            </a:extLst>
+          </p:cNvPr>
+          <p:cNvPicPr>
+            <a:picLocks noChangeAspect="1"/>
+          </p:cNvPicPr>
+          <p:nvPr/>
+        </p:nvPicPr>
+        <p:blipFill>
+          <a:blip r:embed="rId8" cstate="print">
+            <a:extLst>
+              <a:ext uri="{28A0092B-C50C-407E-A947-70E740481C1C}">
+                <a14:useLocalDpi xmlns:a14="http://schemas.microsoft.com/office/drawing/2010/main" val="0"/>
+              </a:ext>
+            </a:extLst>
+          </a:blip>
+          <a:stretch>
+            <a:fillRect/>
+          </a:stretch>
+        </p:blipFill>
+        <p:spPr>
+          <a:xfrm>
+            <a:off x="564125" y="303308"/>
+            <a:ext cx="662913" cy="241227"/>
+          </a:xfrm>
+          <a:prstGeom prst="rect">
+            <a:avLst/>
+          </a:prstGeom>
+        </p:spPr>
+      </p:pic>
     </p:spTree>
     <p:extLst>
       <p:ext uri="{BB962C8B-B14F-4D97-AF65-F5344CB8AC3E}">
@@ -5941,47 +6121,78 @@
           </a:p>
         </p:txBody>
       </p:sp>
-      <p:sp>
-        <p:nvSpPr>
-          <p:cNvPr id="2" name="CaixaDeTexto 1">
-            <a:extLst>
-              <a:ext uri="{FF2B5EF4-FFF2-40B4-BE49-F238E27FC236}">
-                <a16:creationId xmlns:a16="http://schemas.microsoft.com/office/drawing/2014/main" id="{4C94E286-45BF-4B8E-8518-70B5DE5A240B}"/>
-              </a:ext>
-            </a:extLst>
-          </p:cNvPr>
-          <p:cNvSpPr txBox="1"/>
-          <p:nvPr/>
-        </p:nvSpPr>
-        <p:spPr>
-          <a:xfrm>
-            <a:off x="439947" y="238664"/>
-            <a:ext cx="2743200" cy="369332"/>
-          </a:xfrm>
-          <a:prstGeom prst="rect">
-            <a:avLst/>
-          </a:prstGeom>
-          <a:noFill/>
-        </p:spPr>
-        <p:txBody>
-          <a:bodyPr rot="0" spcFirstLastPara="0" vertOverflow="overflow" horzOverflow="overflow" vert="horz" wrap="square" lIns="91440" tIns="45720" rIns="91440" bIns="45720" numCol="1" spcCol="0" rtlCol="0" fromWordArt="0" anchor="t" anchorCtr="0" forceAA="0" compatLnSpc="1">
-            <a:prstTxWarp prst="textNoShape">
-              <a:avLst/>
-            </a:prstTxWarp>
-            <a:spAutoFit/>
-          </a:bodyPr>
-          <a:lstStyle/>
-          <a:p>
-            <a:r>
-              <a:rPr lang="pt-BR" i="1">
-                <a:latin typeface="PMingLiU-ExtB"/>
-              </a:rPr>
-              <a:t>KPR</a:t>
-            </a:r>
-            <a:endParaRPr lang="pt-BR"/>
-          </a:p>
-        </p:txBody>
-      </p:sp>
+      <p:pic>
+        <p:nvPicPr>
+          <p:cNvPr id="22" name="Imagem 21">
+            <a:extLst>
+              <a:ext uri="{FF2B5EF4-FFF2-40B4-BE49-F238E27FC236}">
+                <a16:creationId xmlns:a16="http://schemas.microsoft.com/office/drawing/2014/main" id="{A8C87232-FAC8-4590-9A91-10054F7D6F5F}"/>
+              </a:ext>
+            </a:extLst>
+          </p:cNvPr>
+          <p:cNvPicPr>
+            <a:picLocks noChangeAspect="1"/>
+          </p:cNvPicPr>
+          <p:nvPr/>
+        </p:nvPicPr>
+        <p:blipFill>
+          <a:blip r:embed="rId9" cstate="print">
+            <a:extLst>
+              <a:ext uri="{28A0092B-C50C-407E-A947-70E740481C1C}">
+                <a14:useLocalDpi xmlns:a14="http://schemas.microsoft.com/office/drawing/2010/main" val="0"/>
+              </a:ext>
+            </a:extLst>
+          </a:blip>
+          <a:stretch>
+            <a:fillRect/>
+          </a:stretch>
+        </p:blipFill>
+        <p:spPr>
+          <a:xfrm>
+            <a:off x="234640" y="251302"/>
+            <a:ext cx="276347" cy="276347"/>
+          </a:xfrm>
+          <a:prstGeom prst="rect">
+            <a:avLst/>
+          </a:prstGeom>
+        </p:spPr>
+      </p:pic>
+      <p:pic>
+        <p:nvPicPr>
+          <p:cNvPr id="23" name="Imagem 22">
+            <a:extLst>
+              <a:ext uri="{FF2B5EF4-FFF2-40B4-BE49-F238E27FC236}">
+                <a16:creationId xmlns:a16="http://schemas.microsoft.com/office/drawing/2014/main" id="{DE51372F-101A-4A66-8CE7-2FA578169F17}"/>
+              </a:ext>
+            </a:extLst>
+          </p:cNvPr>
+          <p:cNvPicPr>
+            <a:picLocks noChangeAspect="1"/>
+          </p:cNvPicPr>
+          <p:nvPr/>
+        </p:nvPicPr>
+        <p:blipFill>
+          <a:blip r:embed="rId10" cstate="print">
+            <a:extLst>
+              <a:ext uri="{28A0092B-C50C-407E-A947-70E740481C1C}">
+                <a14:useLocalDpi xmlns:a14="http://schemas.microsoft.com/office/drawing/2010/main" val="0"/>
+              </a:ext>
+            </a:extLst>
+          </a:blip>
+          <a:stretch>
+            <a:fillRect/>
+          </a:stretch>
+        </p:blipFill>
+        <p:spPr>
+          <a:xfrm>
+            <a:off x="564125" y="303308"/>
+            <a:ext cx="662913" cy="241227"/>
+          </a:xfrm>
+          <a:prstGeom prst="rect">
+            <a:avLst/>
+          </a:prstGeom>
+        </p:spPr>
+      </p:pic>
     </p:spTree>
     <p:extLst>
       <p:ext uri="{BB962C8B-B14F-4D97-AF65-F5344CB8AC3E}">
@@ -6848,47 +7059,78 @@
           </a:prstGeom>
         </p:spPr>
       </p:pic>
-      <p:sp>
-        <p:nvSpPr>
-          <p:cNvPr id="3" name="CaixaDeTexto 2">
-            <a:extLst>
-              <a:ext uri="{FF2B5EF4-FFF2-40B4-BE49-F238E27FC236}">
-                <a16:creationId xmlns:a16="http://schemas.microsoft.com/office/drawing/2014/main" id="{02654C36-9AAA-4074-83AD-2404ABE9BA0E}"/>
-              </a:ext>
-            </a:extLst>
-          </p:cNvPr>
-          <p:cNvSpPr txBox="1"/>
-          <p:nvPr/>
-        </p:nvSpPr>
-        <p:spPr>
-          <a:xfrm>
-            <a:off x="468702" y="253042"/>
-            <a:ext cx="2743200" cy="369332"/>
-          </a:xfrm>
-          <a:prstGeom prst="rect">
-            <a:avLst/>
-          </a:prstGeom>
-          <a:noFill/>
-        </p:spPr>
-        <p:txBody>
-          <a:bodyPr rot="0" spcFirstLastPara="0" vertOverflow="overflow" horzOverflow="overflow" vert="horz" wrap="square" lIns="91440" tIns="45720" rIns="91440" bIns="45720" numCol="1" spcCol="0" rtlCol="0" fromWordArt="0" anchor="t" anchorCtr="0" forceAA="0" compatLnSpc="1">
-            <a:prstTxWarp prst="textNoShape">
-              <a:avLst/>
-            </a:prstTxWarp>
-            <a:spAutoFit/>
-          </a:bodyPr>
-          <a:lstStyle/>
-          <a:p>
-            <a:r>
-              <a:rPr lang="pt-BR" i="1">
-                <a:latin typeface="PMingLiU-ExtB"/>
-              </a:rPr>
-              <a:t>KPR</a:t>
-            </a:r>
-            <a:endParaRPr lang="pt-BR"/>
-          </a:p>
-        </p:txBody>
-      </p:sp>
+      <p:pic>
+        <p:nvPicPr>
+          <p:cNvPr id="31" name="Imagem 30">
+            <a:extLst>
+              <a:ext uri="{FF2B5EF4-FFF2-40B4-BE49-F238E27FC236}">
+                <a16:creationId xmlns:a16="http://schemas.microsoft.com/office/drawing/2014/main" id="{2F38D2C9-B03B-44AB-BA56-26383EAEC0B4}"/>
+              </a:ext>
+            </a:extLst>
+          </p:cNvPr>
+          <p:cNvPicPr>
+            <a:picLocks noChangeAspect="1"/>
+          </p:cNvPicPr>
+          <p:nvPr/>
+        </p:nvPicPr>
+        <p:blipFill>
+          <a:blip r:embed="rId16" cstate="print">
+            <a:extLst>
+              <a:ext uri="{28A0092B-C50C-407E-A947-70E740481C1C}">
+                <a14:useLocalDpi xmlns:a14="http://schemas.microsoft.com/office/drawing/2010/main" val="0"/>
+              </a:ext>
+            </a:extLst>
+          </a:blip>
+          <a:stretch>
+            <a:fillRect/>
+          </a:stretch>
+        </p:blipFill>
+        <p:spPr>
+          <a:xfrm>
+            <a:off x="234640" y="251302"/>
+            <a:ext cx="276347" cy="276347"/>
+          </a:xfrm>
+          <a:prstGeom prst="rect">
+            <a:avLst/>
+          </a:prstGeom>
+        </p:spPr>
+      </p:pic>
+      <p:pic>
+        <p:nvPicPr>
+          <p:cNvPr id="33" name="Imagem 32">
+            <a:extLst>
+              <a:ext uri="{FF2B5EF4-FFF2-40B4-BE49-F238E27FC236}">
+                <a16:creationId xmlns:a16="http://schemas.microsoft.com/office/drawing/2014/main" id="{D98A2357-5484-45A9-BABE-0D1CFE27057C}"/>
+              </a:ext>
+            </a:extLst>
+          </p:cNvPr>
+          <p:cNvPicPr>
+            <a:picLocks noChangeAspect="1"/>
+          </p:cNvPicPr>
+          <p:nvPr/>
+        </p:nvPicPr>
+        <p:blipFill>
+          <a:blip r:embed="rId17" cstate="print">
+            <a:extLst>
+              <a:ext uri="{28A0092B-C50C-407E-A947-70E740481C1C}">
+                <a14:useLocalDpi xmlns:a14="http://schemas.microsoft.com/office/drawing/2010/main" val="0"/>
+              </a:ext>
+            </a:extLst>
+          </a:blip>
+          <a:stretch>
+            <a:fillRect/>
+          </a:stretch>
+        </p:blipFill>
+        <p:spPr>
+          <a:xfrm>
+            <a:off x="564125" y="303308"/>
+            <a:ext cx="662913" cy="241227"/>
+          </a:xfrm>
+          <a:prstGeom prst="rect">
+            <a:avLst/>
+          </a:prstGeom>
+        </p:spPr>
+      </p:pic>
     </p:spTree>
     <p:extLst>
       <p:ext uri="{BB962C8B-B14F-4D97-AF65-F5344CB8AC3E}">

</xml_diff>

<commit_message>
StoryBoard com correções ortográficas
Corrigi uns erros gráficos e de escrita, mas agora foi
</commit_message>
<xml_diff>
--- a/Documentacao/StoryBoard_KPRunnin'.pptx
+++ b/Documentacao/StoryBoard_KPRunnin'.pptx
@@ -261,7 +261,7 @@
           <a:p>
             <a:fld id="{F0E51C7C-CEA3-4CAA-BE4B-344879E7C377}" type="datetimeFigureOut">
               <a:rPr lang="de-DE" smtClean="0"/>
-              <a:t>13.03.2020</a:t>
+              <a:t>14.03.2020</a:t>
             </a:fld>
             <a:endParaRPr lang="de-DE"/>
           </a:p>
@@ -431,7 +431,7 @@
           <a:p>
             <a:fld id="{F0E51C7C-CEA3-4CAA-BE4B-344879E7C377}" type="datetimeFigureOut">
               <a:rPr lang="de-DE" smtClean="0"/>
-              <a:t>13.03.2020</a:t>
+              <a:t>14.03.2020</a:t>
             </a:fld>
             <a:endParaRPr lang="de-DE"/>
           </a:p>
@@ -611,7 +611,7 @@
           <a:p>
             <a:fld id="{F0E51C7C-CEA3-4CAA-BE4B-344879E7C377}" type="datetimeFigureOut">
               <a:rPr lang="de-DE" smtClean="0"/>
-              <a:t>13.03.2020</a:t>
+              <a:t>14.03.2020</a:t>
             </a:fld>
             <a:endParaRPr lang="de-DE"/>
           </a:p>
@@ -781,7 +781,7 @@
           <a:p>
             <a:fld id="{F0E51C7C-CEA3-4CAA-BE4B-344879E7C377}" type="datetimeFigureOut">
               <a:rPr lang="de-DE" smtClean="0"/>
-              <a:t>13.03.2020</a:t>
+              <a:t>14.03.2020</a:t>
             </a:fld>
             <a:endParaRPr lang="de-DE"/>
           </a:p>
@@ -1027,7 +1027,7 @@
           <a:p>
             <a:fld id="{F0E51C7C-CEA3-4CAA-BE4B-344879E7C377}" type="datetimeFigureOut">
               <a:rPr lang="de-DE" smtClean="0"/>
-              <a:t>13.03.2020</a:t>
+              <a:t>14.03.2020</a:t>
             </a:fld>
             <a:endParaRPr lang="de-DE"/>
           </a:p>
@@ -1259,7 +1259,7 @@
           <a:p>
             <a:fld id="{F0E51C7C-CEA3-4CAA-BE4B-344879E7C377}" type="datetimeFigureOut">
               <a:rPr lang="de-DE" smtClean="0"/>
-              <a:t>13.03.2020</a:t>
+              <a:t>14.03.2020</a:t>
             </a:fld>
             <a:endParaRPr lang="de-DE"/>
           </a:p>
@@ -1626,7 +1626,7 @@
           <a:p>
             <a:fld id="{F0E51C7C-CEA3-4CAA-BE4B-344879E7C377}" type="datetimeFigureOut">
               <a:rPr lang="de-DE" smtClean="0"/>
-              <a:t>13.03.2020</a:t>
+              <a:t>14.03.2020</a:t>
             </a:fld>
             <a:endParaRPr lang="de-DE"/>
           </a:p>
@@ -1744,7 +1744,7 @@
           <a:p>
             <a:fld id="{F0E51C7C-CEA3-4CAA-BE4B-344879E7C377}" type="datetimeFigureOut">
               <a:rPr lang="de-DE" smtClean="0"/>
-              <a:t>13.03.2020</a:t>
+              <a:t>14.03.2020</a:t>
             </a:fld>
             <a:endParaRPr lang="de-DE"/>
           </a:p>
@@ -1839,7 +1839,7 @@
           <a:p>
             <a:fld id="{F0E51C7C-CEA3-4CAA-BE4B-344879E7C377}" type="datetimeFigureOut">
               <a:rPr lang="de-DE" smtClean="0"/>
-              <a:t>13.03.2020</a:t>
+              <a:t>14.03.2020</a:t>
             </a:fld>
             <a:endParaRPr lang="de-DE"/>
           </a:p>
@@ -2116,7 +2116,7 @@
           <a:p>
             <a:fld id="{F0E51C7C-CEA3-4CAA-BE4B-344879E7C377}" type="datetimeFigureOut">
               <a:rPr lang="de-DE" smtClean="0"/>
-              <a:t>13.03.2020</a:t>
+              <a:t>14.03.2020</a:t>
             </a:fld>
             <a:endParaRPr lang="de-DE"/>
           </a:p>
@@ -2369,7 +2369,7 @@
           <a:p>
             <a:fld id="{F0E51C7C-CEA3-4CAA-BE4B-344879E7C377}" type="datetimeFigureOut">
               <a:rPr lang="de-DE" smtClean="0"/>
-              <a:t>13.03.2020</a:t>
+              <a:t>14.03.2020</a:t>
             </a:fld>
             <a:endParaRPr lang="de-DE"/>
           </a:p>
@@ -2582,7 +2582,7 @@
           <a:p>
             <a:fld id="{F0E51C7C-CEA3-4CAA-BE4B-344879E7C377}" type="datetimeFigureOut">
               <a:rPr lang="de-DE" smtClean="0"/>
-              <a:t>13.03.2020</a:t>
+              <a:t>14.03.2020</a:t>
             </a:fld>
             <a:endParaRPr lang="de-DE"/>
           </a:p>
@@ -2992,7 +2992,7 @@
           <p:cNvPr id="6" name="Elipse 5">
             <a:extLst>
               <a:ext uri="{FF2B5EF4-FFF2-40B4-BE49-F238E27FC236}">
-                <a16:creationId xmlns:a16="http://schemas.microsoft.com/office/drawing/2014/main" id="{D684DE99-E59E-4BB6-BDE3-2476E5950B02}"/>
+                <a16:creationId xmlns:a16="http://schemas.microsoft.com/office/drawing/2014/main" xmlns="" id="{D684DE99-E59E-4BB6-BDE3-2476E5950B02}"/>
               </a:ext>
             </a:extLst>
           </p:cNvPr>
@@ -3043,7 +3043,7 @@
           <p:cNvPr id="5" name="Cilindro 4">
             <a:extLst>
               <a:ext uri="{FF2B5EF4-FFF2-40B4-BE49-F238E27FC236}">
-                <a16:creationId xmlns:a16="http://schemas.microsoft.com/office/drawing/2014/main" id="{AF258ECB-68CE-400A-8558-73A6186B11E8}"/>
+                <a16:creationId xmlns:a16="http://schemas.microsoft.com/office/drawing/2014/main" xmlns="" id="{AF258ECB-68CE-400A-8558-73A6186B11E8}"/>
               </a:ext>
             </a:extLst>
           </p:cNvPr>
@@ -3092,7 +3092,7 @@
           <p:cNvPr id="4" name="Retângulo 3">
             <a:extLst>
               <a:ext uri="{FF2B5EF4-FFF2-40B4-BE49-F238E27FC236}">
-                <a16:creationId xmlns:a16="http://schemas.microsoft.com/office/drawing/2014/main" id="{C5C8C1F3-18EC-41C3-91BD-DB7B75F11817}"/>
+                <a16:creationId xmlns:a16="http://schemas.microsoft.com/office/drawing/2014/main" xmlns="" id="{C5C8C1F3-18EC-41C3-91BD-DB7B75F11817}"/>
               </a:ext>
             </a:extLst>
           </p:cNvPr>
@@ -3143,7 +3143,7 @@
           <p:cNvPr id="7" name="Retângulo 6">
             <a:extLst>
               <a:ext uri="{FF2B5EF4-FFF2-40B4-BE49-F238E27FC236}">
-                <a16:creationId xmlns:a16="http://schemas.microsoft.com/office/drawing/2014/main" id="{6484F657-7FEB-49DF-AA8D-9A92749FE158}"/>
+                <a16:creationId xmlns:a16="http://schemas.microsoft.com/office/drawing/2014/main" xmlns="" id="{6484F657-7FEB-49DF-AA8D-9A92749FE158}"/>
               </a:ext>
             </a:extLst>
           </p:cNvPr>
@@ -3192,7 +3192,7 @@
           <p:cNvPr id="11" name="Imagem 10">
             <a:extLst>
               <a:ext uri="{FF2B5EF4-FFF2-40B4-BE49-F238E27FC236}">
-                <a16:creationId xmlns:a16="http://schemas.microsoft.com/office/drawing/2014/main" id="{4A73C3C7-B5D8-4B07-B9D6-E0685211ACFE}"/>
+                <a16:creationId xmlns:a16="http://schemas.microsoft.com/office/drawing/2014/main" xmlns="" id="{4A73C3C7-B5D8-4B07-B9D6-E0685211ACFE}"/>
               </a:ext>
             </a:extLst>
           </p:cNvPr>
@@ -3223,118 +3223,186 @@
           </a:prstGeom>
         </p:spPr>
       </p:pic>
-      <p:sp>
-        <p:nvSpPr>
-          <p:cNvPr id="8" name="CaixaDeTexto 7">
-            <a:extLst>
-              <a:ext uri="{FF2B5EF4-FFF2-40B4-BE49-F238E27FC236}">
-                <a16:creationId xmlns:a16="http://schemas.microsoft.com/office/drawing/2014/main" id="{E24C646B-8114-4AC3-8191-A6480518A402}"/>
-              </a:ext>
-            </a:extLst>
-          </p:cNvPr>
-          <p:cNvSpPr txBox="1"/>
-          <p:nvPr/>
-        </p:nvSpPr>
-        <p:spPr>
-          <a:xfrm>
-            <a:off x="-5751" y="-5751"/>
-            <a:ext cx="12203501" cy="369332"/>
-          </a:xfrm>
-          <a:prstGeom prst="rect">
-            <a:avLst/>
-          </a:prstGeom>
-          <a:noFill/>
-        </p:spPr>
-        <p:txBody>
-          <a:bodyPr rot="0" spcFirstLastPara="0" vertOverflow="overflow" horzOverflow="overflow" vert="horz" wrap="square" lIns="91440" tIns="45720" rIns="91440" bIns="45720" numCol="1" spcCol="0" rtlCol="0" fromWordArt="0" anchor="t" anchorCtr="0" forceAA="0" compatLnSpc="1">
-            <a:prstTxWarp prst="textNoShape">
-              <a:avLst/>
-            </a:prstTxWarp>
-            <a:spAutoFit/>
-          </a:bodyPr>
+      <p:pic>
+        <p:nvPicPr>
+          <p:cNvPr id="13" name="Imagem 12">
+            <a:extLst>
+              <a:ext uri="{FF2B5EF4-FFF2-40B4-BE49-F238E27FC236}">
+                <a16:creationId xmlns:a16="http://schemas.microsoft.com/office/drawing/2014/main" xmlns="" id="{E741D897-D77E-4B03-8341-D23046F5B7F0}"/>
+              </a:ext>
+            </a:extLst>
+          </p:cNvPr>
+          <p:cNvPicPr>
+            <a:picLocks noChangeAspect="1"/>
+          </p:cNvPicPr>
+          <p:nvPr/>
+        </p:nvPicPr>
+        <p:blipFill>
+          <a:blip r:embed="rId3" cstate="print">
+            <a:extLst>
+              <a:ext uri="{28A0092B-C50C-407E-A947-70E740481C1C}">
+                <a14:useLocalDpi xmlns:a14="http://schemas.microsoft.com/office/drawing/2010/main" val="0"/>
+              </a:ext>
+            </a:extLst>
+          </a:blip>
+          <a:stretch>
+            <a:fillRect/>
+          </a:stretch>
+        </p:blipFill>
+        <p:spPr>
+          <a:xfrm>
+            <a:off x="5214705" y="2473710"/>
+            <a:ext cx="2895625" cy="1053686"/>
+          </a:xfrm>
+          <a:prstGeom prst="rect">
+            <a:avLst/>
+          </a:prstGeom>
+        </p:spPr>
+      </p:pic>
+      <p:sp>
+        <p:nvSpPr>
+          <p:cNvPr id="10" name="Retângulo 9">
+            <a:extLst>
+              <a:ext uri="{FF2B5EF4-FFF2-40B4-BE49-F238E27FC236}">
+                <a16:creationId xmlns:a16="http://schemas.microsoft.com/office/drawing/2014/main" xmlns="" id="{B9B206CE-0C9B-45C3-B2B4-5C8EE57BD0E1}"/>
+              </a:ext>
+            </a:extLst>
+          </p:cNvPr>
+          <p:cNvSpPr/>
+          <p:nvPr/>
+        </p:nvSpPr>
+        <p:spPr>
+          <a:xfrm>
+            <a:off x="1" y="-4313"/>
+            <a:ext cx="12194874" cy="1063924"/>
+          </a:xfrm>
+          <a:prstGeom prst="rect">
+            <a:avLst/>
+          </a:prstGeom>
+          <a:solidFill>
+            <a:schemeClr val="bg1"/>
+          </a:solidFill>
+        </p:spPr>
+        <p:style>
+          <a:lnRef idx="2">
+            <a:schemeClr val="accent1">
+              <a:shade val="50000"/>
+            </a:schemeClr>
+          </a:lnRef>
+          <a:fillRef idx="1">
+            <a:schemeClr val="accent1"/>
+          </a:fillRef>
+          <a:effectRef idx="0">
+            <a:schemeClr val="accent1"/>
+          </a:effectRef>
+          <a:fontRef idx="minor">
+            <a:schemeClr val="lt1"/>
+          </a:fontRef>
+        </p:style>
+        <p:txBody>
+          <a:bodyPr rtlCol="0" anchor="ctr"/>
           <a:lstStyle/>
           <a:p>
-            <a:r>
-              <a:rPr lang="pt-BR" dirty="0">
+            <a:pPr algn="ctr"/>
+            <a:r>
+              <a:rPr lang="pt-BR" sz="2400" dirty="0">
+                <a:solidFill>
+                  <a:schemeClr val="tx1"/>
+                </a:solidFill>
                 <a:cs typeface="Calibri"/>
               </a:rPr>
               <a:t>Eu sou o </a:t>
             </a:r>
             <a:r>
-              <a:rPr lang="pt-BR" dirty="0" err="1">
+              <a:rPr lang="pt-BR" sz="2400" dirty="0" err="1" smtClean="0">
+                <a:solidFill>
+                  <a:schemeClr val="tx1"/>
+                </a:solidFill>
                 <a:cs typeface="Calibri"/>
               </a:rPr>
               <a:t>KPRunnin</a:t>
             </a:r>
             <a:r>
-              <a:rPr lang="pt-BR" dirty="0">
+              <a:rPr lang="pt-BR" sz="2400" dirty="0" smtClean="0">
+                <a:solidFill>
+                  <a:schemeClr val="tx1"/>
+                </a:solidFill>
                 <a:cs typeface="Calibri"/>
               </a:rPr>
-              <a:t>' e fui </a:t>
-            </a:r>
-            <a:r>
-              <a:rPr lang="pt-BR" dirty="0" err="1">
+              <a:t>‘, </a:t>
+            </a:r>
+            <a:r>
+              <a:rPr lang="pt-BR" sz="2400" dirty="0">
+                <a:solidFill>
+                  <a:schemeClr val="tx1"/>
+                </a:solidFill>
+                <a:cs typeface="Calibri"/>
+              </a:rPr>
+              <a:t>e fui </a:t>
+            </a:r>
+            <a:r>
+              <a:rPr lang="pt-BR" sz="2400" dirty="0" err="1">
+                <a:solidFill>
+                  <a:schemeClr val="tx1"/>
+                </a:solidFill>
                 <a:cs typeface="Calibri"/>
               </a:rPr>
               <a:t>construido</a:t>
             </a:r>
             <a:r>
-              <a:rPr lang="pt-BR" dirty="0">
+              <a:rPr lang="pt-BR" sz="2400" dirty="0">
+                <a:solidFill>
+                  <a:schemeClr val="tx1"/>
+                </a:solidFill>
                 <a:cs typeface="Calibri"/>
               </a:rPr>
               <a:t> pela </a:t>
             </a:r>
             <a:r>
-              <a:rPr lang="pt-BR" dirty="0" err="1">
+              <a:rPr lang="pt-BR" sz="2400" dirty="0" err="1" smtClean="0">
+                <a:solidFill>
+                  <a:schemeClr val="tx1"/>
+                </a:solidFill>
                 <a:cs typeface="Calibri"/>
               </a:rPr>
-              <a:t>Primeloigtters</a:t>
-            </a:r>
-            <a:r>
-              <a:rPr lang="pt-BR" dirty="0">
+              <a:t>Primeloitters</a:t>
+            </a:r>
+            <a:r>
+              <a:rPr lang="pt-BR" sz="2400" dirty="0" smtClean="0">
+                <a:solidFill>
+                  <a:schemeClr val="tx1"/>
+                </a:solidFill>
                 <a:cs typeface="Calibri"/>
               </a:rPr>
-              <a:t> para resolver problemas como o da Valéria</a:t>
-            </a:r>
-          </a:p>
-        </p:txBody>
-      </p:sp>
-      <p:pic>
-        <p:nvPicPr>
-          <p:cNvPr id="13" name="Imagem 12">
-            <a:extLst>
-              <a:ext uri="{FF2B5EF4-FFF2-40B4-BE49-F238E27FC236}">
-                <a16:creationId xmlns:a16="http://schemas.microsoft.com/office/drawing/2014/main" id="{E741D897-D77E-4B03-8341-D23046F5B7F0}"/>
-              </a:ext>
-            </a:extLst>
-          </p:cNvPr>
-          <p:cNvPicPr>
-            <a:picLocks noChangeAspect="1"/>
-          </p:cNvPicPr>
-          <p:nvPr/>
-        </p:nvPicPr>
-        <p:blipFill>
-          <a:blip r:embed="rId3" cstate="print">
-            <a:extLst>
-              <a:ext uri="{28A0092B-C50C-407E-A947-70E740481C1C}">
-                <a14:useLocalDpi xmlns:a14="http://schemas.microsoft.com/office/drawing/2010/main" val="0"/>
-              </a:ext>
-            </a:extLst>
-          </a:blip>
-          <a:stretch>
-            <a:fillRect/>
-          </a:stretch>
-        </p:blipFill>
-        <p:spPr>
-          <a:xfrm>
-            <a:off x="5214705" y="2473710"/>
-            <a:ext cx="2895625" cy="1053686"/>
-          </a:xfrm>
-          <a:prstGeom prst="rect">
-            <a:avLst/>
-          </a:prstGeom>
-        </p:spPr>
-      </p:pic>
+              <a:t> </a:t>
+            </a:r>
+            <a:r>
+              <a:rPr lang="pt-BR" sz="2400" dirty="0">
+                <a:solidFill>
+                  <a:schemeClr val="tx1"/>
+                </a:solidFill>
+                <a:cs typeface="Calibri"/>
+              </a:rPr>
+              <a:t>para resolver problemas como o da </a:t>
+            </a:r>
+            <a:r>
+              <a:rPr lang="pt-BR" sz="2400" dirty="0" smtClean="0">
+                <a:solidFill>
+                  <a:schemeClr val="tx1"/>
+                </a:solidFill>
+                <a:cs typeface="Calibri"/>
+              </a:rPr>
+              <a:t>Valéria.</a:t>
+            </a:r>
+            <a:endParaRPr lang="pt-BR" sz="2400" dirty="0">
+              <a:solidFill>
+                <a:schemeClr val="tx1"/>
+              </a:solidFill>
+              <a:cs typeface="Calibri"/>
+            </a:endParaRPr>
+          </a:p>
+        </p:txBody>
+      </p:sp>
     </p:spTree>
     <p:extLst>
       <p:ext uri="{BB962C8B-B14F-4D97-AF65-F5344CB8AC3E}">
@@ -3370,7 +3438,7 @@
           <p:cNvPr id="17" name="Retângulo 16">
             <a:extLst>
               <a:ext uri="{FF2B5EF4-FFF2-40B4-BE49-F238E27FC236}">
-                <a16:creationId xmlns:a16="http://schemas.microsoft.com/office/drawing/2014/main" id="{B9B206CE-0C9B-45C3-B2B4-5C8EE57BD0E1}"/>
+                <a16:creationId xmlns:a16="http://schemas.microsoft.com/office/drawing/2014/main" xmlns="" id="{B9B206CE-0C9B-45C3-B2B4-5C8EE57BD0E1}"/>
               </a:ext>
             </a:extLst>
           </p:cNvPr>
@@ -3417,8 +3485,41 @@
                 </a:solidFill>
                 <a:cs typeface="Calibri"/>
               </a:rPr>
-              <a:t>A Valéria é gerente de uma de várias lojas de varejo e sofre com constantes perdas financeiras causadas por travamento de suas máquinas de ponto de venda</a:t>
-            </a:r>
+              <a:t>A Valéria é gerente de uma de várias lojas de </a:t>
+            </a:r>
+            <a:r>
+              <a:rPr lang="pt-BR" sz="2400" dirty="0" smtClean="0">
+                <a:solidFill>
+                  <a:schemeClr val="tx1"/>
+                </a:solidFill>
+                <a:cs typeface="Calibri"/>
+              </a:rPr>
+              <a:t>varejo, </a:t>
+            </a:r>
+            <a:r>
+              <a:rPr lang="pt-BR" sz="2400" dirty="0">
+                <a:solidFill>
+                  <a:schemeClr val="tx1"/>
+                </a:solidFill>
+                <a:cs typeface="Calibri"/>
+              </a:rPr>
+              <a:t>e sofre com constantes perdas financeiras causadas por travamento de suas máquinas de ponto de </a:t>
+            </a:r>
+            <a:r>
+              <a:rPr lang="pt-BR" sz="2400" dirty="0" smtClean="0">
+                <a:solidFill>
+                  <a:schemeClr val="tx1"/>
+                </a:solidFill>
+                <a:cs typeface="Calibri"/>
+              </a:rPr>
+              <a:t>venda.</a:t>
+            </a:r>
+            <a:endParaRPr lang="pt-BR" sz="2400" dirty="0">
+              <a:solidFill>
+                <a:schemeClr val="tx1"/>
+              </a:solidFill>
+              <a:cs typeface="Calibri"/>
+            </a:endParaRPr>
           </a:p>
         </p:txBody>
       </p:sp>
@@ -3427,7 +3528,7 @@
           <p:cNvPr id="12" name="Imagem 12">
             <a:extLst>
               <a:ext uri="{FF2B5EF4-FFF2-40B4-BE49-F238E27FC236}">
-                <a16:creationId xmlns:a16="http://schemas.microsoft.com/office/drawing/2014/main" id="{62B13955-04BA-4E4E-97D2-131D76A30DD1}"/>
+                <a16:creationId xmlns:a16="http://schemas.microsoft.com/office/drawing/2014/main" xmlns="" id="{62B13955-04BA-4E4E-97D2-131D76A30DD1}"/>
               </a:ext>
             </a:extLst>
           </p:cNvPr>
@@ -3456,7 +3557,7 @@
           <p:cNvPr id="3" name="Imagem 3" descr="Desenho de personagem de desenho animado&#10;&#10;Descrição gerada com alta confiança">
             <a:extLst>
               <a:ext uri="{FF2B5EF4-FFF2-40B4-BE49-F238E27FC236}">
-                <a16:creationId xmlns:a16="http://schemas.microsoft.com/office/drawing/2014/main" id="{4C2595DE-28D5-469C-8232-894ADFEF7C39}"/>
+                <a16:creationId xmlns:a16="http://schemas.microsoft.com/office/drawing/2014/main" xmlns="" id="{4C2595DE-28D5-469C-8232-894ADFEF7C39}"/>
               </a:ext>
             </a:extLst>
           </p:cNvPr>
@@ -3486,7 +3587,7 @@
           <p:cNvPr id="8" name="Imagem 8" descr="Uma imagem contendo mesa, desenho, computador&#10;&#10;Descrição gerada com muito alta confiança">
             <a:extLst>
               <a:ext uri="{FF2B5EF4-FFF2-40B4-BE49-F238E27FC236}">
-                <a16:creationId xmlns:a16="http://schemas.microsoft.com/office/drawing/2014/main" id="{F95CF79E-D49F-43CB-AF54-EF80AB3B1D42}"/>
+                <a16:creationId xmlns:a16="http://schemas.microsoft.com/office/drawing/2014/main" xmlns="" id="{F95CF79E-D49F-43CB-AF54-EF80AB3B1D42}"/>
               </a:ext>
             </a:extLst>
           </p:cNvPr>
@@ -3516,7 +3617,7 @@
           <p:cNvPr id="18" name="Imagem 6" descr="Uma imagem contendo visor, desenho&#10;&#10;Descrição gerada com muito alta confiança">
             <a:extLst>
               <a:ext uri="{FF2B5EF4-FFF2-40B4-BE49-F238E27FC236}">
-                <a16:creationId xmlns:a16="http://schemas.microsoft.com/office/drawing/2014/main" id="{4FB3C014-FCEA-4765-A1D6-5CFB60E26F6B}"/>
+                <a16:creationId xmlns:a16="http://schemas.microsoft.com/office/drawing/2014/main" xmlns="" id="{4FB3C014-FCEA-4765-A1D6-5CFB60E26F6B}"/>
               </a:ext>
             </a:extLst>
           </p:cNvPr>
@@ -3546,7 +3647,7 @@
           <p:cNvPr id="29" name="Imagem 25" descr="Uma imagem contendo desenho&#10;&#10;Descrição gerada com muito alta confiança">
             <a:extLst>
               <a:ext uri="{FF2B5EF4-FFF2-40B4-BE49-F238E27FC236}">
-                <a16:creationId xmlns:a16="http://schemas.microsoft.com/office/drawing/2014/main" id="{046CF860-843D-46BC-A9DD-B5D6E1A54E1E}"/>
+                <a16:creationId xmlns:a16="http://schemas.microsoft.com/office/drawing/2014/main" xmlns="" id="{046CF860-843D-46BC-A9DD-B5D6E1A54E1E}"/>
               </a:ext>
             </a:extLst>
           </p:cNvPr>
@@ -3576,7 +3677,7 @@
           <p:cNvPr id="30" name="Imagem 25" descr="Uma imagem contendo desenho&#10;&#10;Descrição gerada com muito alta confiança">
             <a:extLst>
               <a:ext uri="{FF2B5EF4-FFF2-40B4-BE49-F238E27FC236}">
-                <a16:creationId xmlns:a16="http://schemas.microsoft.com/office/drawing/2014/main" id="{893E5ED5-DAE9-4DAC-A7E0-A88366F9DAC1}"/>
+                <a16:creationId xmlns:a16="http://schemas.microsoft.com/office/drawing/2014/main" xmlns="" id="{893E5ED5-DAE9-4DAC-A7E0-A88366F9DAC1}"/>
               </a:ext>
             </a:extLst>
           </p:cNvPr>
@@ -3606,7 +3707,7 @@
           <p:cNvPr id="31" name="Imagem 25" descr="Uma imagem contendo desenho&#10;&#10;Descrição gerada com muito alta confiança">
             <a:extLst>
               <a:ext uri="{FF2B5EF4-FFF2-40B4-BE49-F238E27FC236}">
-                <a16:creationId xmlns:a16="http://schemas.microsoft.com/office/drawing/2014/main" id="{5152665A-6716-469A-8F82-92C19E7CB9C5}"/>
+                <a16:creationId xmlns:a16="http://schemas.microsoft.com/office/drawing/2014/main" xmlns="" id="{5152665A-6716-469A-8F82-92C19E7CB9C5}"/>
               </a:ext>
             </a:extLst>
           </p:cNvPr>
@@ -3636,7 +3737,7 @@
           <p:cNvPr id="11" name="Imagem 10">
             <a:extLst>
               <a:ext uri="{FF2B5EF4-FFF2-40B4-BE49-F238E27FC236}">
-                <a16:creationId xmlns:a16="http://schemas.microsoft.com/office/drawing/2014/main" id="{FCCEFDB5-E597-43D6-B8B6-793E4851790F}"/>
+                <a16:creationId xmlns:a16="http://schemas.microsoft.com/office/drawing/2014/main" xmlns="" id="{FCCEFDB5-E597-43D6-B8B6-793E4851790F}"/>
               </a:ext>
             </a:extLst>
           </p:cNvPr>
@@ -3672,7 +3773,7 @@
           <p:cNvPr id="13" name="Imagem 12">
             <a:extLst>
               <a:ext uri="{FF2B5EF4-FFF2-40B4-BE49-F238E27FC236}">
-                <a16:creationId xmlns:a16="http://schemas.microsoft.com/office/drawing/2014/main" id="{B3E1DC22-AE4A-462E-B1BD-870E117AE79D}"/>
+                <a16:creationId xmlns:a16="http://schemas.microsoft.com/office/drawing/2014/main" xmlns="" id="{B3E1DC22-AE4A-462E-B1BD-870E117AE79D}"/>
               </a:ext>
             </a:extLst>
           </p:cNvPr>
@@ -3738,7 +3839,7 @@
           <p:cNvPr id="25" name="Imagem 25" descr="Desenho de personagem de desenho animado&#10;&#10;Descrição gerada com alta confiança">
             <a:extLst>
               <a:ext uri="{FF2B5EF4-FFF2-40B4-BE49-F238E27FC236}">
-                <a16:creationId xmlns:a16="http://schemas.microsoft.com/office/drawing/2014/main" id="{6C3D71D8-FD11-4B76-9CBD-8EBAC3BCBAD6}"/>
+                <a16:creationId xmlns:a16="http://schemas.microsoft.com/office/drawing/2014/main" xmlns="" id="{6C3D71D8-FD11-4B76-9CBD-8EBAC3BCBAD6}"/>
               </a:ext>
             </a:extLst>
           </p:cNvPr>
@@ -3767,7 +3868,7 @@
           <p:cNvPr id="21" name="Imagem 6" descr="Uma imagem contendo mesa, computador, desenho&#10;&#10;Descrição gerada com muito alta confiança">
             <a:extLst>
               <a:ext uri="{FF2B5EF4-FFF2-40B4-BE49-F238E27FC236}">
-                <a16:creationId xmlns:a16="http://schemas.microsoft.com/office/drawing/2014/main" id="{82119A34-5E4A-47D9-8258-48D5A3CBBAD3}"/>
+                <a16:creationId xmlns:a16="http://schemas.microsoft.com/office/drawing/2014/main" xmlns="" id="{82119A34-5E4A-47D9-8258-48D5A3CBBAD3}"/>
               </a:ext>
             </a:extLst>
           </p:cNvPr>
@@ -3797,7 +3898,7 @@
           <p:cNvPr id="24" name="Imagem 6" descr="Uma imagem contendo visor, desenho&#10;&#10;Descrição gerada com muito alta confiança">
             <a:extLst>
               <a:ext uri="{FF2B5EF4-FFF2-40B4-BE49-F238E27FC236}">
-                <a16:creationId xmlns:a16="http://schemas.microsoft.com/office/drawing/2014/main" id="{9BCE6FD8-5327-43B7-8510-D1A9F9F15F6E}"/>
+                <a16:creationId xmlns:a16="http://schemas.microsoft.com/office/drawing/2014/main" xmlns="" id="{9BCE6FD8-5327-43B7-8510-D1A9F9F15F6E}"/>
               </a:ext>
             </a:extLst>
           </p:cNvPr>
@@ -3827,7 +3928,7 @@
           <p:cNvPr id="19" name="Imagem 19" descr="Desenho de personagem de desenho animado&#10;&#10;Descrição gerada com alta confiança">
             <a:extLst>
               <a:ext uri="{FF2B5EF4-FFF2-40B4-BE49-F238E27FC236}">
-                <a16:creationId xmlns:a16="http://schemas.microsoft.com/office/drawing/2014/main" id="{39433304-7C0F-4851-B517-87011B51095A}"/>
+                <a16:creationId xmlns:a16="http://schemas.microsoft.com/office/drawing/2014/main" xmlns="" id="{39433304-7C0F-4851-B517-87011B51095A}"/>
               </a:ext>
             </a:extLst>
           </p:cNvPr>
@@ -3856,7 +3957,7 @@
           <p:cNvPr id="6" name="Imagem 6" descr="Uma imagem contendo mesa, computador, desenho&#10;&#10;Descrição gerada com muito alta confiança">
             <a:extLst>
               <a:ext uri="{FF2B5EF4-FFF2-40B4-BE49-F238E27FC236}">
-                <a16:creationId xmlns:a16="http://schemas.microsoft.com/office/drawing/2014/main" id="{10095229-3E85-449C-9666-F04AC57093AF}"/>
+                <a16:creationId xmlns:a16="http://schemas.microsoft.com/office/drawing/2014/main" xmlns="" id="{10095229-3E85-449C-9666-F04AC57093AF}"/>
               </a:ext>
             </a:extLst>
           </p:cNvPr>
@@ -3886,7 +3987,7 @@
           <p:cNvPr id="17" name="Retângulo 16">
             <a:extLst>
               <a:ext uri="{FF2B5EF4-FFF2-40B4-BE49-F238E27FC236}">
-                <a16:creationId xmlns:a16="http://schemas.microsoft.com/office/drawing/2014/main" id="{B9B206CE-0C9B-45C3-B2B4-5C8EE57BD0E1}"/>
+                <a16:creationId xmlns:a16="http://schemas.microsoft.com/office/drawing/2014/main" xmlns="" id="{B9B206CE-0C9B-45C3-B2B4-5C8EE57BD0E1}"/>
               </a:ext>
             </a:extLst>
           </p:cNvPr>
@@ -3895,8 +3996,8 @@
         </p:nvSpPr>
         <p:spPr>
           <a:xfrm>
-            <a:off x="1354347" y="-4313"/>
-            <a:ext cx="10840527" cy="1063924"/>
+            <a:off x="1301209" y="-4313"/>
+            <a:ext cx="7351821" cy="1063924"/>
           </a:xfrm>
           <a:prstGeom prst="rect">
             <a:avLst/>
@@ -3927,14 +4028,65 @@
           <a:p>
             <a:pPr algn="ctr"/>
             <a:r>
-              <a:rPr lang="pt-BR" dirty="0">
+              <a:rPr lang="pt-BR" sz="2400" dirty="0">
                 <a:solidFill>
                   <a:schemeClr val="tx1"/>
                 </a:solidFill>
                 <a:cs typeface="Calibri"/>
               </a:rPr>
-              <a:t>Isso gera filas, ociosidade dos atendentes, reclamações dos clientes e perdas financeiras no final do mês</a:t>
-            </a:r>
+              <a:t>Isso gera filas, ociosidade dos atendentes, reclamações </a:t>
+            </a:r>
+            <a:r>
+              <a:rPr lang="pt-BR" sz="2400" dirty="0" smtClean="0">
+                <a:solidFill>
+                  <a:schemeClr val="tx1"/>
+                </a:solidFill>
+                <a:cs typeface="Calibri"/>
+              </a:rPr>
+              <a:t>e perda dos </a:t>
+            </a:r>
+            <a:r>
+              <a:rPr lang="pt-BR" sz="2400" dirty="0">
+                <a:solidFill>
+                  <a:schemeClr val="tx1"/>
+                </a:solidFill>
+                <a:cs typeface="Calibri"/>
+              </a:rPr>
+              <a:t>clientes e </a:t>
+            </a:r>
+            <a:r>
+              <a:rPr lang="pt-BR" sz="2400" dirty="0" smtClean="0">
+                <a:solidFill>
+                  <a:schemeClr val="tx1"/>
+                </a:solidFill>
+                <a:cs typeface="Calibri"/>
+              </a:rPr>
+              <a:t>déficit financeiro </a:t>
+            </a:r>
+            <a:r>
+              <a:rPr lang="pt-BR" sz="2400" dirty="0">
+                <a:solidFill>
+                  <a:schemeClr val="tx1"/>
+                </a:solidFill>
+                <a:cs typeface="Calibri"/>
+              </a:rPr>
+              <a:t>no final do </a:t>
+            </a:r>
+            <a:r>
+              <a:rPr lang="pt-BR" sz="2400" dirty="0" smtClean="0">
+                <a:solidFill>
+                  <a:schemeClr val="tx1"/>
+                </a:solidFill>
+                <a:cs typeface="Calibri"/>
+              </a:rPr>
+              <a:t>mês.</a:t>
+            </a:r>
+            <a:endParaRPr lang="pt-BR" sz="2400" dirty="0">
+              <a:solidFill>
+                <a:schemeClr val="tx1"/>
+              </a:solidFill>
+              <a:cs typeface="Calibri"/>
+            </a:endParaRPr>
           </a:p>
         </p:txBody>
       </p:sp>
@@ -3943,7 +4095,7 @@
           <p:cNvPr id="12" name="Imagem 12">
             <a:extLst>
               <a:ext uri="{FF2B5EF4-FFF2-40B4-BE49-F238E27FC236}">
-                <a16:creationId xmlns:a16="http://schemas.microsoft.com/office/drawing/2014/main" id="{62B13955-04BA-4E4E-97D2-131D76A30DD1}"/>
+                <a16:creationId xmlns:a16="http://schemas.microsoft.com/office/drawing/2014/main" xmlns="" id="{62B13955-04BA-4E4E-97D2-131D76A30DD1}"/>
               </a:ext>
             </a:extLst>
           </p:cNvPr>
@@ -3972,7 +4124,7 @@
           <p:cNvPr id="4" name="Imagem 4" descr="Desenho de personagem de desenho animado&#10;&#10;Descrição gerada com alta confiança">
             <a:extLst>
               <a:ext uri="{FF2B5EF4-FFF2-40B4-BE49-F238E27FC236}">
-                <a16:creationId xmlns:a16="http://schemas.microsoft.com/office/drawing/2014/main" id="{BB6645CB-8592-4BBC-90F8-F453E246D51E}"/>
+                <a16:creationId xmlns:a16="http://schemas.microsoft.com/office/drawing/2014/main" xmlns="" id="{BB6645CB-8592-4BBC-90F8-F453E246D51E}"/>
               </a:ext>
             </a:extLst>
           </p:cNvPr>
@@ -4002,7 +4154,7 @@
           <p:cNvPr id="9" name="Imagem 9">
             <a:extLst>
               <a:ext uri="{FF2B5EF4-FFF2-40B4-BE49-F238E27FC236}">
-                <a16:creationId xmlns:a16="http://schemas.microsoft.com/office/drawing/2014/main" id="{86457A34-1ADC-4D52-B233-06E92E51C680}"/>
+                <a16:creationId xmlns:a16="http://schemas.microsoft.com/office/drawing/2014/main" xmlns="" id="{86457A34-1ADC-4D52-B233-06E92E51C680}"/>
               </a:ext>
             </a:extLst>
           </p:cNvPr>
@@ -4032,7 +4184,7 @@
           <p:cNvPr id="11" name="Imagem 12" descr="Desenho de personagem de desenho animado&#10;&#10;Descrição gerada com alta confiança">
             <a:extLst>
               <a:ext uri="{FF2B5EF4-FFF2-40B4-BE49-F238E27FC236}">
-                <a16:creationId xmlns:a16="http://schemas.microsoft.com/office/drawing/2014/main" id="{79FA3C92-8A15-48DC-A66C-82151DCCBC55}"/>
+                <a16:creationId xmlns:a16="http://schemas.microsoft.com/office/drawing/2014/main" xmlns="" id="{79FA3C92-8A15-48DC-A66C-82151DCCBC55}"/>
               </a:ext>
             </a:extLst>
           </p:cNvPr>
@@ -4061,7 +4213,7 @@
           <p:cNvPr id="14" name="Imagem 14" descr="Desenho de personagem de desenho animado&#10;&#10;Descrição gerada com alta confiança">
             <a:extLst>
               <a:ext uri="{FF2B5EF4-FFF2-40B4-BE49-F238E27FC236}">
-                <a16:creationId xmlns:a16="http://schemas.microsoft.com/office/drawing/2014/main" id="{51D4CAD4-E2EE-47F4-A864-7B72C910FB3B}"/>
+                <a16:creationId xmlns:a16="http://schemas.microsoft.com/office/drawing/2014/main" xmlns="" id="{51D4CAD4-E2EE-47F4-A864-7B72C910FB3B}"/>
               </a:ext>
             </a:extLst>
           </p:cNvPr>
@@ -4090,7 +4242,7 @@
           <p:cNvPr id="16" name="Imagem 17" descr="Desenho de personagem de desenho animado&#10;&#10;Descrição gerada com alta confiança">
             <a:extLst>
               <a:ext uri="{FF2B5EF4-FFF2-40B4-BE49-F238E27FC236}">
-                <a16:creationId xmlns:a16="http://schemas.microsoft.com/office/drawing/2014/main" id="{EF971D60-8470-4DDD-A5FB-084BDF4856A2}"/>
+                <a16:creationId xmlns:a16="http://schemas.microsoft.com/office/drawing/2014/main" xmlns="" id="{EF971D60-8470-4DDD-A5FB-084BDF4856A2}"/>
               </a:ext>
             </a:extLst>
           </p:cNvPr>
@@ -4119,7 +4271,7 @@
           <p:cNvPr id="15" name="Imagem 14">
             <a:extLst>
               <a:ext uri="{FF2B5EF4-FFF2-40B4-BE49-F238E27FC236}">
-                <a16:creationId xmlns:a16="http://schemas.microsoft.com/office/drawing/2014/main" id="{74F6FD10-1814-4084-B79C-464A7ED2E07E}"/>
+                <a16:creationId xmlns:a16="http://schemas.microsoft.com/office/drawing/2014/main" xmlns="" id="{74F6FD10-1814-4084-B79C-464A7ED2E07E}"/>
               </a:ext>
             </a:extLst>
           </p:cNvPr>
@@ -4155,7 +4307,7 @@
           <p:cNvPr id="18" name="Imagem 17">
             <a:extLst>
               <a:ext uri="{FF2B5EF4-FFF2-40B4-BE49-F238E27FC236}">
-                <a16:creationId xmlns:a16="http://schemas.microsoft.com/office/drawing/2014/main" id="{01518E4D-2183-462C-BAA4-B7DC1D9AFA07}"/>
+                <a16:creationId xmlns:a16="http://schemas.microsoft.com/office/drawing/2014/main" xmlns="" id="{01518E4D-2183-462C-BAA4-B7DC1D9AFA07}"/>
               </a:ext>
             </a:extLst>
           </p:cNvPr>
@@ -4221,7 +4373,7 @@
           <p:cNvPr id="10" name="Retângulo 9">
             <a:extLst>
               <a:ext uri="{FF2B5EF4-FFF2-40B4-BE49-F238E27FC236}">
-                <a16:creationId xmlns:a16="http://schemas.microsoft.com/office/drawing/2014/main" id="{54DCE989-A73C-4A0F-B488-8B27DA2079EC}"/>
+                <a16:creationId xmlns:a16="http://schemas.microsoft.com/office/drawing/2014/main" xmlns="" id="{54DCE989-A73C-4A0F-B488-8B27DA2079EC}"/>
               </a:ext>
             </a:extLst>
           </p:cNvPr>
@@ -4272,7 +4424,7 @@
           <p:cNvPr id="4" name="Imagem 4" descr="Uma imagem contendo janela, mesa&#10;&#10;Descrição gerada com muito alta confiança">
             <a:extLst>
               <a:ext uri="{FF2B5EF4-FFF2-40B4-BE49-F238E27FC236}">
-                <a16:creationId xmlns:a16="http://schemas.microsoft.com/office/drawing/2014/main" id="{B2BA99A6-348A-4D3E-9204-5753F8948409}"/>
+                <a16:creationId xmlns:a16="http://schemas.microsoft.com/office/drawing/2014/main" xmlns="" id="{B2BA99A6-348A-4D3E-9204-5753F8948409}"/>
               </a:ext>
             </a:extLst>
           </p:cNvPr>
@@ -4301,7 +4453,7 @@
           <p:cNvPr id="17" name="Retângulo 16">
             <a:extLst>
               <a:ext uri="{FF2B5EF4-FFF2-40B4-BE49-F238E27FC236}">
-                <a16:creationId xmlns:a16="http://schemas.microsoft.com/office/drawing/2014/main" id="{B9B206CE-0C9B-45C3-B2B4-5C8EE57BD0E1}"/>
+                <a16:creationId xmlns:a16="http://schemas.microsoft.com/office/drawing/2014/main" xmlns="" id="{B9B206CE-0C9B-45C3-B2B4-5C8EE57BD0E1}"/>
               </a:ext>
             </a:extLst>
           </p:cNvPr>
@@ -4311,7 +4463,7 @@
         <p:spPr>
           <a:xfrm>
             <a:off x="1354347" y="-4313"/>
-            <a:ext cx="10840527" cy="1063924"/>
+            <a:ext cx="10837653" cy="1018996"/>
           </a:xfrm>
           <a:prstGeom prst="rect">
             <a:avLst/>
@@ -4342,14 +4494,47 @@
           <a:p>
             <a:pPr algn="ctr"/>
             <a:r>
-              <a:rPr lang="pt-BR" dirty="0">
+              <a:rPr lang="pt-BR" sz="2400" dirty="0">
                 <a:solidFill>
                   <a:schemeClr val="tx1"/>
                 </a:solidFill>
                 <a:cs typeface="Calibri"/>
               </a:rPr>
-              <a:t>Trabalhando em conjunto com o Dave Bob eu consigo monitorar o andamento das máquinas em tempo real</a:t>
-            </a:r>
+              <a:t>Trabalhando em conjunto com </a:t>
+            </a:r>
+            <a:r>
+              <a:rPr lang="pt-BR" sz="2400" dirty="0" smtClean="0">
+                <a:solidFill>
+                  <a:schemeClr val="tx1"/>
+                </a:solidFill>
+                <a:cs typeface="Calibri"/>
+              </a:rPr>
+              <a:t>Dave Bob, </a:t>
+            </a:r>
+            <a:r>
+              <a:rPr lang="pt-BR" sz="2400" dirty="0">
+                <a:solidFill>
+                  <a:schemeClr val="tx1"/>
+                </a:solidFill>
+                <a:cs typeface="Calibri"/>
+              </a:rPr>
+              <a:t>eu consigo monitorar o andamento das máquinas em tempo </a:t>
+            </a:r>
+            <a:r>
+              <a:rPr lang="pt-BR" sz="2400" dirty="0" smtClean="0">
+                <a:solidFill>
+                  <a:schemeClr val="tx1"/>
+                </a:solidFill>
+                <a:cs typeface="Calibri"/>
+              </a:rPr>
+              <a:t>real.</a:t>
+            </a:r>
+            <a:endParaRPr lang="pt-BR" sz="2400" dirty="0">
+              <a:solidFill>
+                <a:schemeClr val="tx1"/>
+              </a:solidFill>
+              <a:cs typeface="Calibri"/>
+            </a:endParaRPr>
           </a:p>
         </p:txBody>
       </p:sp>
@@ -4358,7 +4543,7 @@
           <p:cNvPr id="12" name="Imagem 12">
             <a:extLst>
               <a:ext uri="{FF2B5EF4-FFF2-40B4-BE49-F238E27FC236}">
-                <a16:creationId xmlns:a16="http://schemas.microsoft.com/office/drawing/2014/main" id="{62B13955-04BA-4E4E-97D2-131D76A30DD1}"/>
+                <a16:creationId xmlns:a16="http://schemas.microsoft.com/office/drawing/2014/main" xmlns="" id="{62B13955-04BA-4E4E-97D2-131D76A30DD1}"/>
               </a:ext>
             </a:extLst>
           </p:cNvPr>
@@ -4375,7 +4560,7 @@
         <p:spPr>
           <a:xfrm>
             <a:off x="181155" y="98305"/>
-            <a:ext cx="1120054" cy="927584"/>
+            <a:ext cx="1120054" cy="916378"/>
           </a:xfrm>
           <a:prstGeom prst="rect">
             <a:avLst/>
@@ -4387,7 +4572,7 @@
           <p:cNvPr id="6" name="Imagem 6" descr="Desenho de personagem de desenho animado&#10;&#10;Descrição gerada com alta confiança">
             <a:extLst>
               <a:ext uri="{FF2B5EF4-FFF2-40B4-BE49-F238E27FC236}">
-                <a16:creationId xmlns:a16="http://schemas.microsoft.com/office/drawing/2014/main" id="{12A897EE-A4FC-44E1-B0BB-A011081FE70A}"/>
+                <a16:creationId xmlns:a16="http://schemas.microsoft.com/office/drawing/2014/main" xmlns="" id="{12A897EE-A4FC-44E1-B0BB-A011081FE70A}"/>
               </a:ext>
             </a:extLst>
           </p:cNvPr>
@@ -4416,7 +4601,7 @@
           <p:cNvPr id="11" name="Imagem 4" descr="Desenho de personagem de desenho animado&#10;&#10;Descrição gerada com alta confiança">
             <a:extLst>
               <a:ext uri="{FF2B5EF4-FFF2-40B4-BE49-F238E27FC236}">
-                <a16:creationId xmlns:a16="http://schemas.microsoft.com/office/drawing/2014/main" id="{DE00FDA9-B6F6-4004-97EC-1FF1E951931B}"/>
+                <a16:creationId xmlns:a16="http://schemas.microsoft.com/office/drawing/2014/main" xmlns="" id="{DE00FDA9-B6F6-4004-97EC-1FF1E951931B}"/>
               </a:ext>
             </a:extLst>
           </p:cNvPr>
@@ -4446,7 +4631,7 @@
           <p:cNvPr id="14" name="Imagem 4" descr="Desenho de personagem de desenho animado&#10;&#10;Descrição gerada com alta confiança">
             <a:extLst>
               <a:ext uri="{FF2B5EF4-FFF2-40B4-BE49-F238E27FC236}">
-                <a16:creationId xmlns:a16="http://schemas.microsoft.com/office/drawing/2014/main" id="{762E8760-8E43-48A1-A12D-24EA6BFE53A4}"/>
+                <a16:creationId xmlns:a16="http://schemas.microsoft.com/office/drawing/2014/main" xmlns="" id="{762E8760-8E43-48A1-A12D-24EA6BFE53A4}"/>
               </a:ext>
             </a:extLst>
           </p:cNvPr>
@@ -4476,7 +4661,7 @@
           <p:cNvPr id="16" name="Imagem 4" descr="Desenho de personagem de desenho animado&#10;&#10;Descrição gerada com alta confiança">
             <a:extLst>
               <a:ext uri="{FF2B5EF4-FFF2-40B4-BE49-F238E27FC236}">
-                <a16:creationId xmlns:a16="http://schemas.microsoft.com/office/drawing/2014/main" id="{6461D0BB-B12F-4AA6-BA31-5902F1B1F5DA}"/>
+                <a16:creationId xmlns:a16="http://schemas.microsoft.com/office/drawing/2014/main" xmlns="" id="{6461D0BB-B12F-4AA6-BA31-5902F1B1F5DA}"/>
               </a:ext>
             </a:extLst>
           </p:cNvPr>
@@ -4506,7 +4691,7 @@
           <p:cNvPr id="20" name="Imagem 4" descr="Desenho de personagem de desenho animado&#10;&#10;Descrição gerada com alta confiança">
             <a:extLst>
               <a:ext uri="{FF2B5EF4-FFF2-40B4-BE49-F238E27FC236}">
-                <a16:creationId xmlns:a16="http://schemas.microsoft.com/office/drawing/2014/main" id="{7EB54A45-67EF-42D7-A7F4-1DAD66010606}"/>
+                <a16:creationId xmlns:a16="http://schemas.microsoft.com/office/drawing/2014/main" xmlns="" id="{7EB54A45-67EF-42D7-A7F4-1DAD66010606}"/>
               </a:ext>
             </a:extLst>
           </p:cNvPr>
@@ -4536,7 +4721,7 @@
           <p:cNvPr id="22" name="Imagem 4" descr="Desenho de personagem de desenho animado&#10;&#10;Descrição gerada com alta confiança">
             <a:extLst>
               <a:ext uri="{FF2B5EF4-FFF2-40B4-BE49-F238E27FC236}">
-                <a16:creationId xmlns:a16="http://schemas.microsoft.com/office/drawing/2014/main" id="{7BB87F26-CF39-4DBF-87D7-2CD99941CB0F}"/>
+                <a16:creationId xmlns:a16="http://schemas.microsoft.com/office/drawing/2014/main" xmlns="" id="{7BB87F26-CF39-4DBF-87D7-2CD99941CB0F}"/>
               </a:ext>
             </a:extLst>
           </p:cNvPr>
@@ -4566,7 +4751,7 @@
           <p:cNvPr id="13" name="Imagem 12">
             <a:extLst>
               <a:ext uri="{FF2B5EF4-FFF2-40B4-BE49-F238E27FC236}">
-                <a16:creationId xmlns:a16="http://schemas.microsoft.com/office/drawing/2014/main" id="{A4944088-1702-45AA-A075-39EFCB1BB404}"/>
+                <a16:creationId xmlns:a16="http://schemas.microsoft.com/office/drawing/2014/main" xmlns="" id="{A4944088-1702-45AA-A075-39EFCB1BB404}"/>
               </a:ext>
             </a:extLst>
           </p:cNvPr>
@@ -4602,7 +4787,7 @@
           <p:cNvPr id="15" name="Imagem 14">
             <a:extLst>
               <a:ext uri="{FF2B5EF4-FFF2-40B4-BE49-F238E27FC236}">
-                <a16:creationId xmlns:a16="http://schemas.microsoft.com/office/drawing/2014/main" id="{4BE8FAB4-63FC-4C89-9FAF-29375B906A72}"/>
+                <a16:creationId xmlns:a16="http://schemas.microsoft.com/office/drawing/2014/main" xmlns="" id="{4BE8FAB4-63FC-4C89-9FAF-29375B906A72}"/>
               </a:ext>
             </a:extLst>
           </p:cNvPr>
@@ -4668,7 +4853,7 @@
           <p:cNvPr id="17" name="Retângulo 16">
             <a:extLst>
               <a:ext uri="{FF2B5EF4-FFF2-40B4-BE49-F238E27FC236}">
-                <a16:creationId xmlns:a16="http://schemas.microsoft.com/office/drawing/2014/main" id="{B9B206CE-0C9B-45C3-B2B4-5C8EE57BD0E1}"/>
+                <a16:creationId xmlns:a16="http://schemas.microsoft.com/office/drawing/2014/main" xmlns="" id="{B9B206CE-0C9B-45C3-B2B4-5C8EE57BD0E1}"/>
               </a:ext>
             </a:extLst>
           </p:cNvPr>
@@ -4709,14 +4894,47 @@
           <a:p>
             <a:pPr algn="ctr"/>
             <a:r>
-              <a:rPr lang="pt-BR" dirty="0">
+              <a:rPr lang="pt-BR" sz="2400" dirty="0">
                 <a:solidFill>
                   <a:schemeClr val="tx1"/>
                 </a:solidFill>
                 <a:cs typeface="Calibri"/>
               </a:rPr>
-              <a:t>Gero relatórios de dados de CPU, Memória e Disco e os demonstro em gráficos para auxiliar no diagnóstico do problema feito pelo Dave Bob</a:t>
-            </a:r>
+              <a:t>Gero relatórios de dados </a:t>
+            </a:r>
+            <a:r>
+              <a:rPr lang="pt-BR" sz="2400" dirty="0" smtClean="0">
+                <a:solidFill>
+                  <a:schemeClr val="tx1"/>
+                </a:solidFill>
+                <a:cs typeface="Calibri"/>
+              </a:rPr>
+              <a:t>da </a:t>
+            </a:r>
+            <a:r>
+              <a:rPr lang="pt-BR" sz="2400" dirty="0">
+                <a:solidFill>
+                  <a:schemeClr val="tx1"/>
+                </a:solidFill>
+                <a:cs typeface="Calibri"/>
+              </a:rPr>
+              <a:t>CPU, Memória e Disco e os demonstro em gráficos para auxiliar no diagnóstico do problema feito pelo Dave </a:t>
+            </a:r>
+            <a:r>
+              <a:rPr lang="pt-BR" sz="2400" dirty="0" smtClean="0">
+                <a:solidFill>
+                  <a:schemeClr val="tx1"/>
+                </a:solidFill>
+                <a:cs typeface="Calibri"/>
+              </a:rPr>
+              <a:t>Bob.</a:t>
+            </a:r>
+            <a:endParaRPr lang="pt-BR" sz="2400" dirty="0">
+              <a:solidFill>
+                <a:schemeClr val="tx1"/>
+              </a:solidFill>
+              <a:cs typeface="Calibri"/>
+            </a:endParaRPr>
           </a:p>
         </p:txBody>
       </p:sp>
@@ -4725,7 +4943,7 @@
           <p:cNvPr id="12" name="Imagem 12">
             <a:extLst>
               <a:ext uri="{FF2B5EF4-FFF2-40B4-BE49-F238E27FC236}">
-                <a16:creationId xmlns:a16="http://schemas.microsoft.com/office/drawing/2014/main" id="{62B13955-04BA-4E4E-97D2-131D76A30DD1}"/>
+                <a16:creationId xmlns:a16="http://schemas.microsoft.com/office/drawing/2014/main" xmlns="" id="{62B13955-04BA-4E4E-97D2-131D76A30DD1}"/>
               </a:ext>
             </a:extLst>
           </p:cNvPr>
@@ -4754,7 +4972,7 @@
           <p:cNvPr id="2" name="Imagem 2" descr="Uma imagem contendo desenho&#10;&#10;Descrição gerada com muito alta confiança">
             <a:extLst>
               <a:ext uri="{FF2B5EF4-FFF2-40B4-BE49-F238E27FC236}">
-                <a16:creationId xmlns:a16="http://schemas.microsoft.com/office/drawing/2014/main" id="{D4F33036-AEDE-4E5A-87CC-465E7E4FFE4F}"/>
+                <a16:creationId xmlns:a16="http://schemas.microsoft.com/office/drawing/2014/main" xmlns="" id="{D4F33036-AEDE-4E5A-87CC-465E7E4FFE4F}"/>
               </a:ext>
             </a:extLst>
           </p:cNvPr>
@@ -4784,7 +5002,7 @@
           <p:cNvPr id="4" name="Imagem 4">
             <a:extLst>
               <a:ext uri="{FF2B5EF4-FFF2-40B4-BE49-F238E27FC236}">
-                <a16:creationId xmlns:a16="http://schemas.microsoft.com/office/drawing/2014/main" id="{D28332F0-78CF-4765-A91B-D6B045B01018}"/>
+                <a16:creationId xmlns:a16="http://schemas.microsoft.com/office/drawing/2014/main" xmlns="" id="{D28332F0-78CF-4765-A91B-D6B045B01018}"/>
               </a:ext>
             </a:extLst>
           </p:cNvPr>
@@ -4814,7 +5032,7 @@
           <p:cNvPr id="6" name="Imagem 6" descr="Uma imagem contendo relógio, placa, desenho&#10;&#10;Descrição gerada com muito alta confiança">
             <a:extLst>
               <a:ext uri="{FF2B5EF4-FFF2-40B4-BE49-F238E27FC236}">
-                <a16:creationId xmlns:a16="http://schemas.microsoft.com/office/drawing/2014/main" id="{2636B296-333A-4BAC-9DAE-09AA0FBF8E64}"/>
+                <a16:creationId xmlns:a16="http://schemas.microsoft.com/office/drawing/2014/main" xmlns="" id="{2636B296-333A-4BAC-9DAE-09AA0FBF8E64}"/>
               </a:ext>
             </a:extLst>
           </p:cNvPr>
@@ -4844,7 +5062,7 @@
           <p:cNvPr id="8" name="Imagem 8" descr="Uma imagem contendo texto, desenho&#10;&#10;Descrição gerada com muito alta confiança">
             <a:extLst>
               <a:ext uri="{FF2B5EF4-FFF2-40B4-BE49-F238E27FC236}">
-                <a16:creationId xmlns:a16="http://schemas.microsoft.com/office/drawing/2014/main" id="{71B6B140-7E75-4B66-BC46-6C73FB89305C}"/>
+                <a16:creationId xmlns:a16="http://schemas.microsoft.com/office/drawing/2014/main" xmlns="" id="{71B6B140-7E75-4B66-BC46-6C73FB89305C}"/>
               </a:ext>
             </a:extLst>
           </p:cNvPr>
@@ -4874,7 +5092,7 @@
           <p:cNvPr id="10" name="Imagem 10" descr="Uma imagem contendo texto, desenho, placar&#10;&#10;Descrição gerada com muito alta confiança">
             <a:extLst>
               <a:ext uri="{FF2B5EF4-FFF2-40B4-BE49-F238E27FC236}">
-                <a16:creationId xmlns:a16="http://schemas.microsoft.com/office/drawing/2014/main" id="{27B961E7-38C8-43D5-8778-8FB67F762408}"/>
+                <a16:creationId xmlns:a16="http://schemas.microsoft.com/office/drawing/2014/main" xmlns="" id="{27B961E7-38C8-43D5-8778-8FB67F762408}"/>
               </a:ext>
             </a:extLst>
           </p:cNvPr>
@@ -4904,7 +5122,7 @@
           <p:cNvPr id="13" name="Seta: para a Direita 12">
             <a:extLst>
               <a:ext uri="{FF2B5EF4-FFF2-40B4-BE49-F238E27FC236}">
-                <a16:creationId xmlns:a16="http://schemas.microsoft.com/office/drawing/2014/main" id="{2868CAB2-DBD1-4AB6-9FB6-E2D267B3669F}"/>
+                <a16:creationId xmlns:a16="http://schemas.microsoft.com/office/drawing/2014/main" xmlns="" id="{2868CAB2-DBD1-4AB6-9FB6-E2D267B3669F}"/>
               </a:ext>
             </a:extLst>
           </p:cNvPr>
@@ -4950,7 +5168,7 @@
           <p:cNvPr id="14" name="Imagem 14" descr="Uma imagem contendo desenho&#10;&#10;Descrição gerada com muito alta confiança">
             <a:extLst>
               <a:ext uri="{FF2B5EF4-FFF2-40B4-BE49-F238E27FC236}">
-                <a16:creationId xmlns:a16="http://schemas.microsoft.com/office/drawing/2014/main" id="{C8BAFB1F-F29B-44A2-842F-2ACDC473C069}"/>
+                <a16:creationId xmlns:a16="http://schemas.microsoft.com/office/drawing/2014/main" xmlns="" id="{C8BAFB1F-F29B-44A2-842F-2ACDC473C069}"/>
               </a:ext>
             </a:extLst>
           </p:cNvPr>
@@ -4980,7 +5198,7 @@
           <p:cNvPr id="15" name="Imagem 14">
             <a:extLst>
               <a:ext uri="{FF2B5EF4-FFF2-40B4-BE49-F238E27FC236}">
-                <a16:creationId xmlns:a16="http://schemas.microsoft.com/office/drawing/2014/main" id="{75465CFC-8F10-4AE8-A6CE-E5FC1311CD67}"/>
+                <a16:creationId xmlns:a16="http://schemas.microsoft.com/office/drawing/2014/main" xmlns="" id="{75465CFC-8F10-4AE8-A6CE-E5FC1311CD67}"/>
               </a:ext>
             </a:extLst>
           </p:cNvPr>
@@ -5016,7 +5234,7 @@
           <p:cNvPr id="16" name="Imagem 15">
             <a:extLst>
               <a:ext uri="{FF2B5EF4-FFF2-40B4-BE49-F238E27FC236}">
-                <a16:creationId xmlns:a16="http://schemas.microsoft.com/office/drawing/2014/main" id="{6EAC00C8-E109-4123-BDC1-EEE0DEB0D5CF}"/>
+                <a16:creationId xmlns:a16="http://schemas.microsoft.com/office/drawing/2014/main" xmlns="" id="{6EAC00C8-E109-4123-BDC1-EEE0DEB0D5CF}"/>
               </a:ext>
             </a:extLst>
           </p:cNvPr>
@@ -5082,7 +5300,7 @@
           <p:cNvPr id="17" name="Retângulo 16">
             <a:extLst>
               <a:ext uri="{FF2B5EF4-FFF2-40B4-BE49-F238E27FC236}">
-                <a16:creationId xmlns:a16="http://schemas.microsoft.com/office/drawing/2014/main" id="{B9B206CE-0C9B-45C3-B2B4-5C8EE57BD0E1}"/>
+                <a16:creationId xmlns:a16="http://schemas.microsoft.com/office/drawing/2014/main" xmlns="" id="{B9B206CE-0C9B-45C3-B2B4-5C8EE57BD0E1}"/>
               </a:ext>
             </a:extLst>
           </p:cNvPr>
@@ -5123,14 +5341,29 @@
           <a:p>
             <a:pPr algn="ctr"/>
             <a:r>
-              <a:rPr lang="pt-BR" dirty="0">
+              <a:rPr lang="pt-BR" sz="2400" dirty="0">
                 <a:solidFill>
                   <a:schemeClr val="tx1"/>
                 </a:solidFill>
                 <a:cs typeface="Calibri"/>
               </a:rPr>
-              <a:t>Emito alertas quando os dados coletados estão fora do padrão aceitável</a:t>
-            </a:r>
+              <a:t>Emito alertas quando os dados coletados estão fora do padrão </a:t>
+            </a:r>
+            <a:r>
+              <a:rPr lang="pt-BR" sz="2400" dirty="0" smtClean="0">
+                <a:solidFill>
+                  <a:schemeClr val="tx1"/>
+                </a:solidFill>
+                <a:cs typeface="Calibri"/>
+              </a:rPr>
+              <a:t>aceitável.</a:t>
+            </a:r>
+            <a:endParaRPr lang="pt-BR" sz="2400" dirty="0">
+              <a:solidFill>
+                <a:schemeClr val="tx1"/>
+              </a:solidFill>
+              <a:cs typeface="Calibri"/>
+            </a:endParaRPr>
           </a:p>
         </p:txBody>
       </p:sp>
@@ -5139,7 +5372,7 @@
           <p:cNvPr id="12" name="Imagem 12">
             <a:extLst>
               <a:ext uri="{FF2B5EF4-FFF2-40B4-BE49-F238E27FC236}">
-                <a16:creationId xmlns:a16="http://schemas.microsoft.com/office/drawing/2014/main" id="{62B13955-04BA-4E4E-97D2-131D76A30DD1}"/>
+                <a16:creationId xmlns:a16="http://schemas.microsoft.com/office/drawing/2014/main" xmlns="" id="{62B13955-04BA-4E4E-97D2-131D76A30DD1}"/>
               </a:ext>
             </a:extLst>
           </p:cNvPr>
@@ -5168,7 +5401,7 @@
           <p:cNvPr id="2" name="Imagem 4" descr="Uma imagem contendo janela, mesa&#10;&#10;Descrição gerada com muito alta confiança">
             <a:extLst>
               <a:ext uri="{FF2B5EF4-FFF2-40B4-BE49-F238E27FC236}">
-                <a16:creationId xmlns:a16="http://schemas.microsoft.com/office/drawing/2014/main" id="{584777B8-F5A3-4DDF-8B1F-84E454FB71E0}"/>
+                <a16:creationId xmlns:a16="http://schemas.microsoft.com/office/drawing/2014/main" xmlns="" id="{584777B8-F5A3-4DDF-8B1F-84E454FB71E0}"/>
               </a:ext>
             </a:extLst>
           </p:cNvPr>
@@ -5197,7 +5430,7 @@
           <p:cNvPr id="3" name="Imagem 4" descr="Desenho de personagem de desenho animado&#10;&#10;Descrição gerada com alta confiança">
             <a:extLst>
               <a:ext uri="{FF2B5EF4-FFF2-40B4-BE49-F238E27FC236}">
-                <a16:creationId xmlns:a16="http://schemas.microsoft.com/office/drawing/2014/main" id="{87770156-DED6-4B4C-8F55-DD01DA672FE1}"/>
+                <a16:creationId xmlns:a16="http://schemas.microsoft.com/office/drawing/2014/main" xmlns="" id="{87770156-DED6-4B4C-8F55-DD01DA672FE1}"/>
               </a:ext>
             </a:extLst>
           </p:cNvPr>
@@ -5227,7 +5460,7 @@
           <p:cNvPr id="6" name="Imagem 6" descr="Uma imagem contendo desenho&#10;&#10;Descrição gerada com muito alta confiança">
             <a:extLst>
               <a:ext uri="{FF2B5EF4-FFF2-40B4-BE49-F238E27FC236}">
-                <a16:creationId xmlns:a16="http://schemas.microsoft.com/office/drawing/2014/main" id="{88D7376C-5D54-4A22-BA49-13D08C9D18CE}"/>
+                <a16:creationId xmlns:a16="http://schemas.microsoft.com/office/drawing/2014/main" xmlns="" id="{88D7376C-5D54-4A22-BA49-13D08C9D18CE}"/>
               </a:ext>
             </a:extLst>
           </p:cNvPr>
@@ -5257,7 +5490,7 @@
           <p:cNvPr id="8" name="Imagem 8" descr="Desenho de um círculo&#10;&#10;Descrição gerada com alta confiança">
             <a:extLst>
               <a:ext uri="{FF2B5EF4-FFF2-40B4-BE49-F238E27FC236}">
-                <a16:creationId xmlns:a16="http://schemas.microsoft.com/office/drawing/2014/main" id="{DCB65760-AB64-43FD-83CA-0F7BDC7E159C}"/>
+                <a16:creationId xmlns:a16="http://schemas.microsoft.com/office/drawing/2014/main" xmlns="" id="{DCB65760-AB64-43FD-83CA-0F7BDC7E159C}"/>
               </a:ext>
             </a:extLst>
           </p:cNvPr>
@@ -5287,7 +5520,7 @@
           <p:cNvPr id="13" name="Imagem 4" descr="Desenho de personagem de desenho animado&#10;&#10;Descrição gerada com alta confiança">
             <a:extLst>
               <a:ext uri="{FF2B5EF4-FFF2-40B4-BE49-F238E27FC236}">
-                <a16:creationId xmlns:a16="http://schemas.microsoft.com/office/drawing/2014/main" id="{99068E2B-0AA7-4A32-BA1B-B005A3257E6A}"/>
+                <a16:creationId xmlns:a16="http://schemas.microsoft.com/office/drawing/2014/main" xmlns="" id="{99068E2B-0AA7-4A32-BA1B-B005A3257E6A}"/>
               </a:ext>
             </a:extLst>
           </p:cNvPr>
@@ -5317,7 +5550,7 @@
           <p:cNvPr id="14" name="Imagem 4" descr="Desenho de personagem de desenho animado&#10;&#10;Descrição gerada com alta confiança">
             <a:extLst>
               <a:ext uri="{FF2B5EF4-FFF2-40B4-BE49-F238E27FC236}">
-                <a16:creationId xmlns:a16="http://schemas.microsoft.com/office/drawing/2014/main" id="{FE225DED-43CE-432B-A690-A829817D40FA}"/>
+                <a16:creationId xmlns:a16="http://schemas.microsoft.com/office/drawing/2014/main" xmlns="" id="{FE225DED-43CE-432B-A690-A829817D40FA}"/>
               </a:ext>
             </a:extLst>
           </p:cNvPr>
@@ -5347,7 +5580,7 @@
           <p:cNvPr id="11" name="Imagem 10">
             <a:extLst>
               <a:ext uri="{FF2B5EF4-FFF2-40B4-BE49-F238E27FC236}">
-                <a16:creationId xmlns:a16="http://schemas.microsoft.com/office/drawing/2014/main" id="{567DCC46-0E09-4308-B6C6-816115731803}"/>
+                <a16:creationId xmlns:a16="http://schemas.microsoft.com/office/drawing/2014/main" xmlns="" id="{567DCC46-0E09-4308-B6C6-816115731803}"/>
               </a:ext>
             </a:extLst>
           </p:cNvPr>
@@ -5383,7 +5616,7 @@
           <p:cNvPr id="15" name="Imagem 14">
             <a:extLst>
               <a:ext uri="{FF2B5EF4-FFF2-40B4-BE49-F238E27FC236}">
-                <a16:creationId xmlns:a16="http://schemas.microsoft.com/office/drawing/2014/main" id="{70F69D6D-3C6C-4011-9B17-81F008306796}"/>
+                <a16:creationId xmlns:a16="http://schemas.microsoft.com/office/drawing/2014/main" xmlns="" id="{70F69D6D-3C6C-4011-9B17-81F008306796}"/>
               </a:ext>
             </a:extLst>
           </p:cNvPr>
@@ -5449,7 +5682,7 @@
           <p:cNvPr id="6" name="Retângulo 5">
             <a:extLst>
               <a:ext uri="{FF2B5EF4-FFF2-40B4-BE49-F238E27FC236}">
-                <a16:creationId xmlns:a16="http://schemas.microsoft.com/office/drawing/2014/main" id="{5A2708C4-D2A6-421A-BA4A-A42C39B495E1}"/>
+                <a16:creationId xmlns:a16="http://schemas.microsoft.com/office/drawing/2014/main" xmlns="" id="{5A2708C4-D2A6-421A-BA4A-A42C39B495E1}"/>
               </a:ext>
             </a:extLst>
           </p:cNvPr>
@@ -5498,7 +5731,7 @@
           <p:cNvPr id="17" name="Retângulo 16">
             <a:extLst>
               <a:ext uri="{FF2B5EF4-FFF2-40B4-BE49-F238E27FC236}">
-                <a16:creationId xmlns:a16="http://schemas.microsoft.com/office/drawing/2014/main" id="{B9B206CE-0C9B-45C3-B2B4-5C8EE57BD0E1}"/>
+                <a16:creationId xmlns:a16="http://schemas.microsoft.com/office/drawing/2014/main" xmlns="" id="{B9B206CE-0C9B-45C3-B2B4-5C8EE57BD0E1}"/>
               </a:ext>
             </a:extLst>
           </p:cNvPr>
@@ -5539,23 +5772,65 @@
           <a:p>
             <a:pPr algn="ctr"/>
             <a:r>
-              <a:rPr lang="pt-BR" dirty="0">
+              <a:rPr lang="pt-BR" sz="2400" dirty="0">
                 <a:solidFill>
                   <a:schemeClr val="tx1"/>
                 </a:solidFill>
                 <a:cs typeface="Calibri"/>
               </a:rPr>
-              <a:t>E forneço ferramentas de testes para que o Dave Bob possa testar o máximo que o servidor suporta e definir </a:t>
-            </a:r>
-            <a:r>
-              <a:rPr lang="pt-BR">
+              <a:t>F</a:t>
+            </a:r>
+            <a:r>
+              <a:rPr lang="pt-BR" sz="2400" dirty="0" smtClean="0">
                 <a:solidFill>
                   <a:schemeClr val="tx1"/>
                 </a:solidFill>
                 <a:cs typeface="Calibri"/>
               </a:rPr>
-              <a:t>limites que não devem ser ultrapassados durante o dia-a-dia</a:t>
-            </a:r>
+              <a:t>orneço </a:t>
+            </a:r>
+            <a:r>
+              <a:rPr lang="pt-BR" sz="2400" dirty="0">
+                <a:solidFill>
+                  <a:schemeClr val="tx1"/>
+                </a:solidFill>
+                <a:cs typeface="Calibri"/>
+              </a:rPr>
+              <a:t>ferramentas de testes para que o Dave Bob possa testar o máximo que o servidor </a:t>
+            </a:r>
+            <a:r>
+              <a:rPr lang="pt-BR" sz="2400" dirty="0" smtClean="0">
+                <a:solidFill>
+                  <a:schemeClr val="tx1"/>
+                </a:solidFill>
+                <a:cs typeface="Calibri"/>
+              </a:rPr>
+              <a:t>suporta, e assim definir </a:t>
+            </a:r>
+            <a:r>
+              <a:rPr lang="pt-BR" sz="2400" dirty="0">
+                <a:solidFill>
+                  <a:schemeClr val="tx1"/>
+                </a:solidFill>
+                <a:cs typeface="Calibri"/>
+              </a:rPr>
+              <a:t>limites que não devem ser ultrapassados durante </a:t>
+            </a:r>
+            <a:r>
+              <a:rPr lang="pt-BR" sz="2400" dirty="0" smtClean="0">
+                <a:solidFill>
+                  <a:schemeClr val="tx1"/>
+                </a:solidFill>
+                <a:cs typeface="Calibri"/>
+              </a:rPr>
+              <a:t>a operação.</a:t>
+            </a:r>
+            <a:endParaRPr lang="pt-BR" sz="2400" dirty="0">
+              <a:solidFill>
+                <a:schemeClr val="tx1"/>
+              </a:solidFill>
+              <a:cs typeface="Calibri"/>
+            </a:endParaRPr>
           </a:p>
         </p:txBody>
       </p:sp>
@@ -5564,7 +5839,7 @@
           <p:cNvPr id="12" name="Imagem 12">
             <a:extLst>
               <a:ext uri="{FF2B5EF4-FFF2-40B4-BE49-F238E27FC236}">
-                <a16:creationId xmlns:a16="http://schemas.microsoft.com/office/drawing/2014/main" id="{62B13955-04BA-4E4E-97D2-131D76A30DD1}"/>
+                <a16:creationId xmlns:a16="http://schemas.microsoft.com/office/drawing/2014/main" xmlns="" id="{62B13955-04BA-4E4E-97D2-131D76A30DD1}"/>
               </a:ext>
             </a:extLst>
           </p:cNvPr>
@@ -5593,7 +5868,7 @@
           <p:cNvPr id="11" name="Imagem 4">
             <a:extLst>
               <a:ext uri="{FF2B5EF4-FFF2-40B4-BE49-F238E27FC236}">
-                <a16:creationId xmlns:a16="http://schemas.microsoft.com/office/drawing/2014/main" id="{457F3215-FF0E-4134-A1FC-D5AD154242C1}"/>
+                <a16:creationId xmlns:a16="http://schemas.microsoft.com/office/drawing/2014/main" xmlns="" id="{457F3215-FF0E-4134-A1FC-D5AD154242C1}"/>
               </a:ext>
             </a:extLst>
           </p:cNvPr>
@@ -5623,7 +5898,7 @@
           <p:cNvPr id="13" name="Imagem 4">
             <a:extLst>
               <a:ext uri="{FF2B5EF4-FFF2-40B4-BE49-F238E27FC236}">
-                <a16:creationId xmlns:a16="http://schemas.microsoft.com/office/drawing/2014/main" id="{66260E78-42E3-46A0-B4A7-F1A4EE04E8DF}"/>
+                <a16:creationId xmlns:a16="http://schemas.microsoft.com/office/drawing/2014/main" xmlns="" id="{66260E78-42E3-46A0-B4A7-F1A4EE04E8DF}"/>
               </a:ext>
             </a:extLst>
           </p:cNvPr>
@@ -5653,7 +5928,7 @@
           <p:cNvPr id="14" name="Imagem 4">
             <a:extLst>
               <a:ext uri="{FF2B5EF4-FFF2-40B4-BE49-F238E27FC236}">
-                <a16:creationId xmlns:a16="http://schemas.microsoft.com/office/drawing/2014/main" id="{CE3D4399-389F-4AD7-A8B6-AB15EFF807D4}"/>
+                <a16:creationId xmlns:a16="http://schemas.microsoft.com/office/drawing/2014/main" xmlns="" id="{CE3D4399-389F-4AD7-A8B6-AB15EFF807D4}"/>
               </a:ext>
             </a:extLst>
           </p:cNvPr>
@@ -5683,7 +5958,7 @@
           <p:cNvPr id="15" name="Imagem 4">
             <a:extLst>
               <a:ext uri="{FF2B5EF4-FFF2-40B4-BE49-F238E27FC236}">
-                <a16:creationId xmlns:a16="http://schemas.microsoft.com/office/drawing/2014/main" id="{4B93408D-27A0-4121-A539-4B5A5AE0A893}"/>
+                <a16:creationId xmlns:a16="http://schemas.microsoft.com/office/drawing/2014/main" xmlns="" id="{4B93408D-27A0-4121-A539-4B5A5AE0A893}"/>
               </a:ext>
             </a:extLst>
           </p:cNvPr>
@@ -5713,7 +5988,7 @@
           <p:cNvPr id="16" name="Imagem 4">
             <a:extLst>
               <a:ext uri="{FF2B5EF4-FFF2-40B4-BE49-F238E27FC236}">
-                <a16:creationId xmlns:a16="http://schemas.microsoft.com/office/drawing/2014/main" id="{5A1E838B-85DA-4041-88AE-D7E8831BB2C2}"/>
+                <a16:creationId xmlns:a16="http://schemas.microsoft.com/office/drawing/2014/main" xmlns="" id="{5A1E838B-85DA-4041-88AE-D7E8831BB2C2}"/>
               </a:ext>
             </a:extLst>
           </p:cNvPr>
@@ -5743,7 +6018,7 @@
           <p:cNvPr id="18" name="Imagem 4">
             <a:extLst>
               <a:ext uri="{FF2B5EF4-FFF2-40B4-BE49-F238E27FC236}">
-                <a16:creationId xmlns:a16="http://schemas.microsoft.com/office/drawing/2014/main" id="{B4DECB70-BBD3-4A1E-B8C2-346C308A217E}"/>
+                <a16:creationId xmlns:a16="http://schemas.microsoft.com/office/drawing/2014/main" xmlns="" id="{B4DECB70-BBD3-4A1E-B8C2-346C308A217E}"/>
               </a:ext>
             </a:extLst>
           </p:cNvPr>
@@ -5773,7 +6048,7 @@
           <p:cNvPr id="19" name="Imagem 4">
             <a:extLst>
               <a:ext uri="{FF2B5EF4-FFF2-40B4-BE49-F238E27FC236}">
-                <a16:creationId xmlns:a16="http://schemas.microsoft.com/office/drawing/2014/main" id="{664253BF-4AFC-4945-A133-656AE7B30F9D}"/>
+                <a16:creationId xmlns:a16="http://schemas.microsoft.com/office/drawing/2014/main" xmlns="" id="{664253BF-4AFC-4945-A133-656AE7B30F9D}"/>
               </a:ext>
             </a:extLst>
           </p:cNvPr>
@@ -5803,7 +6078,7 @@
           <p:cNvPr id="20" name="Imagem 4">
             <a:extLst>
               <a:ext uri="{FF2B5EF4-FFF2-40B4-BE49-F238E27FC236}">
-                <a16:creationId xmlns:a16="http://schemas.microsoft.com/office/drawing/2014/main" id="{C7D46CED-BF22-47EF-9B58-7745326B2575}"/>
+                <a16:creationId xmlns:a16="http://schemas.microsoft.com/office/drawing/2014/main" xmlns="" id="{C7D46CED-BF22-47EF-9B58-7745326B2575}"/>
               </a:ext>
             </a:extLst>
           </p:cNvPr>
@@ -5833,7 +6108,7 @@
           <p:cNvPr id="7" name="Retângulo 6">
             <a:extLst>
               <a:ext uri="{FF2B5EF4-FFF2-40B4-BE49-F238E27FC236}">
-                <a16:creationId xmlns:a16="http://schemas.microsoft.com/office/drawing/2014/main" id="{992A1FFB-5760-4CDF-8338-F3283B446AF2}"/>
+                <a16:creationId xmlns:a16="http://schemas.microsoft.com/office/drawing/2014/main" xmlns="" id="{992A1FFB-5760-4CDF-8338-F3283B446AF2}"/>
               </a:ext>
             </a:extLst>
           </p:cNvPr>
@@ -5882,7 +6157,7 @@
           <p:cNvPr id="27" name="Imagem 27" descr="Uma imagem contendo desenho&#10;&#10;Descrição gerada com muito alta confiança">
             <a:extLst>
               <a:ext uri="{FF2B5EF4-FFF2-40B4-BE49-F238E27FC236}">
-                <a16:creationId xmlns:a16="http://schemas.microsoft.com/office/drawing/2014/main" id="{93BAE167-8CD4-4D44-A4B7-8F072081DFC2}"/>
+                <a16:creationId xmlns:a16="http://schemas.microsoft.com/office/drawing/2014/main" xmlns="" id="{93BAE167-8CD4-4D44-A4B7-8F072081DFC2}"/>
               </a:ext>
             </a:extLst>
           </p:cNvPr>
@@ -5912,7 +6187,7 @@
           <p:cNvPr id="29" name="Gráfico 29" descr="Água">
             <a:extLst>
               <a:ext uri="{FF2B5EF4-FFF2-40B4-BE49-F238E27FC236}">
-                <a16:creationId xmlns:a16="http://schemas.microsoft.com/office/drawing/2014/main" id="{2D0B1995-E48D-4CF0-A6EF-D2C8DA2753D0}"/>
+                <a16:creationId xmlns:a16="http://schemas.microsoft.com/office/drawing/2014/main" xmlns="" id="{2D0B1995-E48D-4CF0-A6EF-D2C8DA2753D0}"/>
               </a:ext>
             </a:extLst>
           </p:cNvPr>
@@ -5925,7 +6200,7 @@
           <a:blip r:embed="rId5">
             <a:extLst>
               <a:ext uri="{96DAC541-7B7A-43D3-8B79-37D633B846F1}">
-                <asvg:svgBlip xmlns:asvg="http://schemas.microsoft.com/office/drawing/2016/SVG/main" r:embed="rId6"/>
+                <asvg:svgBlip xmlns:asvg="http://schemas.microsoft.com/office/drawing/2016/SVG/main" xmlns="" r:embed="rId6"/>
               </a:ext>
             </a:extLst>
           </a:blip>
@@ -5948,7 +6223,7 @@
           <p:cNvPr id="31" name="Gráfico 29" descr="Água">
             <a:extLst>
               <a:ext uri="{FF2B5EF4-FFF2-40B4-BE49-F238E27FC236}">
-                <a16:creationId xmlns:a16="http://schemas.microsoft.com/office/drawing/2014/main" id="{B43BAD57-C6AC-4916-A5A1-3DF9AE41C864}"/>
+                <a16:creationId xmlns:a16="http://schemas.microsoft.com/office/drawing/2014/main" xmlns="" id="{B43BAD57-C6AC-4916-A5A1-3DF9AE41C864}"/>
               </a:ext>
             </a:extLst>
           </p:cNvPr>
@@ -5961,7 +6236,7 @@
           <a:blip r:embed="rId5">
             <a:extLst>
               <a:ext uri="{96DAC541-7B7A-43D3-8B79-37D633B846F1}">
-                <asvg:svgBlip xmlns:asvg="http://schemas.microsoft.com/office/drawing/2016/SVG/main" r:embed="rId6"/>
+                <asvg:svgBlip xmlns:asvg="http://schemas.microsoft.com/office/drawing/2016/SVG/main" xmlns="" r:embed="rId6"/>
               </a:ext>
             </a:extLst>
           </a:blip>
@@ -5984,7 +6259,7 @@
           <p:cNvPr id="32" name="Gráfico 29" descr="Água">
             <a:extLst>
               <a:ext uri="{FF2B5EF4-FFF2-40B4-BE49-F238E27FC236}">
-                <a16:creationId xmlns:a16="http://schemas.microsoft.com/office/drawing/2014/main" id="{8152A702-CED1-4E06-9D0C-02E0B497609B}"/>
+                <a16:creationId xmlns:a16="http://schemas.microsoft.com/office/drawing/2014/main" xmlns="" id="{8152A702-CED1-4E06-9D0C-02E0B497609B}"/>
               </a:ext>
             </a:extLst>
           </p:cNvPr>
@@ -5997,7 +6272,7 @@
           <a:blip r:embed="rId5">
             <a:extLst>
               <a:ext uri="{96DAC541-7B7A-43D3-8B79-37D633B846F1}">
-                <asvg:svgBlip xmlns:asvg="http://schemas.microsoft.com/office/drawing/2016/SVG/main" r:embed="rId6"/>
+                <asvg:svgBlip xmlns:asvg="http://schemas.microsoft.com/office/drawing/2016/SVG/main" xmlns="" r:embed="rId6"/>
               </a:ext>
             </a:extLst>
           </a:blip>
@@ -6020,7 +6295,7 @@
           <p:cNvPr id="35" name="Imagem 35">
             <a:extLst>
               <a:ext uri="{FF2B5EF4-FFF2-40B4-BE49-F238E27FC236}">
-                <a16:creationId xmlns:a16="http://schemas.microsoft.com/office/drawing/2014/main" id="{61FA1989-8495-468F-A77A-C5FBB4628526}"/>
+                <a16:creationId xmlns:a16="http://schemas.microsoft.com/office/drawing/2014/main" xmlns="" id="{61FA1989-8495-468F-A77A-C5FBB4628526}"/>
               </a:ext>
             </a:extLst>
           </p:cNvPr>
@@ -6050,7 +6325,7 @@
           <p:cNvPr id="37" name="Imagem 37" descr="Uma imagem contendo desenho&#10;&#10;Descrição gerada com muito alta confiança">
             <a:extLst>
               <a:ext uri="{FF2B5EF4-FFF2-40B4-BE49-F238E27FC236}">
-                <a16:creationId xmlns:a16="http://schemas.microsoft.com/office/drawing/2014/main" id="{C5217708-0DD7-4F5C-9701-C1CD953BDBD9}"/>
+                <a16:creationId xmlns:a16="http://schemas.microsoft.com/office/drawing/2014/main" xmlns="" id="{C5217708-0DD7-4F5C-9701-C1CD953BDBD9}"/>
               </a:ext>
             </a:extLst>
           </p:cNvPr>
@@ -6080,7 +6355,7 @@
           <p:cNvPr id="39" name="Seta: para a Direita 38">
             <a:extLst>
               <a:ext uri="{FF2B5EF4-FFF2-40B4-BE49-F238E27FC236}">
-                <a16:creationId xmlns:a16="http://schemas.microsoft.com/office/drawing/2014/main" id="{7013E549-AF74-4EE4-BBF7-41CBDE23F29B}"/>
+                <a16:creationId xmlns:a16="http://schemas.microsoft.com/office/drawing/2014/main" xmlns="" id="{7013E549-AF74-4EE4-BBF7-41CBDE23F29B}"/>
               </a:ext>
             </a:extLst>
           </p:cNvPr>
@@ -6126,7 +6401,7 @@
           <p:cNvPr id="22" name="Imagem 21">
             <a:extLst>
               <a:ext uri="{FF2B5EF4-FFF2-40B4-BE49-F238E27FC236}">
-                <a16:creationId xmlns:a16="http://schemas.microsoft.com/office/drawing/2014/main" id="{A8C87232-FAC8-4590-9A91-10054F7D6F5F}"/>
+                <a16:creationId xmlns:a16="http://schemas.microsoft.com/office/drawing/2014/main" xmlns="" id="{A8C87232-FAC8-4590-9A91-10054F7D6F5F}"/>
               </a:ext>
             </a:extLst>
           </p:cNvPr>
@@ -6162,7 +6437,7 @@
           <p:cNvPr id="23" name="Imagem 22">
             <a:extLst>
               <a:ext uri="{FF2B5EF4-FFF2-40B4-BE49-F238E27FC236}">
-                <a16:creationId xmlns:a16="http://schemas.microsoft.com/office/drawing/2014/main" id="{DE51372F-101A-4A66-8CE7-2FA578169F17}"/>
+                <a16:creationId xmlns:a16="http://schemas.microsoft.com/office/drawing/2014/main" xmlns="" id="{DE51372F-101A-4A66-8CE7-2FA578169F17}"/>
               </a:ext>
             </a:extLst>
           </p:cNvPr>
@@ -6228,7 +6503,7 @@
           <p:cNvPr id="39" name="Imagem 39" descr="Desenho de personagem de desenho animado&#10;&#10;Descrição gerada com alta confiança">
             <a:extLst>
               <a:ext uri="{FF2B5EF4-FFF2-40B4-BE49-F238E27FC236}">
-                <a16:creationId xmlns:a16="http://schemas.microsoft.com/office/drawing/2014/main" id="{4B5D23E3-6B48-4751-B430-6D66012C31A9}"/>
+                <a16:creationId xmlns:a16="http://schemas.microsoft.com/office/drawing/2014/main" xmlns="" id="{4B5D23E3-6B48-4751-B430-6D66012C31A9}"/>
               </a:ext>
             </a:extLst>
           </p:cNvPr>
@@ -6258,7 +6533,7 @@
           <p:cNvPr id="34" name="Imagem 6" descr="Uma imagem contendo mesa, computador, desenho&#10;&#10;Descrição gerada com muito alta confiança">
             <a:extLst>
               <a:ext uri="{FF2B5EF4-FFF2-40B4-BE49-F238E27FC236}">
-                <a16:creationId xmlns:a16="http://schemas.microsoft.com/office/drawing/2014/main" id="{FEA4CE77-40A5-462A-947C-65DF06A6137A}"/>
+                <a16:creationId xmlns:a16="http://schemas.microsoft.com/office/drawing/2014/main" xmlns="" id="{FEA4CE77-40A5-462A-947C-65DF06A6137A}"/>
               </a:ext>
             </a:extLst>
           </p:cNvPr>
@@ -6288,7 +6563,7 @@
           <p:cNvPr id="37" name="Imagem 37" descr="Desenho de personagem de desenho animado&#10;&#10;Descrição gerada com alta confiança">
             <a:extLst>
               <a:ext uri="{FF2B5EF4-FFF2-40B4-BE49-F238E27FC236}">
-                <a16:creationId xmlns:a16="http://schemas.microsoft.com/office/drawing/2014/main" id="{3BB4A290-0B12-4C33-A761-A428EDF18417}"/>
+                <a16:creationId xmlns:a16="http://schemas.microsoft.com/office/drawing/2014/main" xmlns="" id="{3BB4A290-0B12-4C33-A761-A428EDF18417}"/>
               </a:ext>
             </a:extLst>
           </p:cNvPr>
@@ -6318,7 +6593,7 @@
           <p:cNvPr id="35" name="Imagem 35" descr="Uma imagem contendo desenho&#10;&#10;Descrição gerada com muito alta confiança">
             <a:extLst>
               <a:ext uri="{FF2B5EF4-FFF2-40B4-BE49-F238E27FC236}">
-                <a16:creationId xmlns:a16="http://schemas.microsoft.com/office/drawing/2014/main" id="{76FB5DE8-CD77-403F-A0CA-A4A14346E9ED}"/>
+                <a16:creationId xmlns:a16="http://schemas.microsoft.com/office/drawing/2014/main" xmlns="" id="{76FB5DE8-CD77-403F-A0CA-A4A14346E9ED}"/>
               </a:ext>
             </a:extLst>
           </p:cNvPr>
@@ -6348,7 +6623,7 @@
           <p:cNvPr id="26" name="Imagem 26" descr="Desenho de personagem de desenho animado&#10;&#10;Descrição gerada com alta confiança">
             <a:extLst>
               <a:ext uri="{FF2B5EF4-FFF2-40B4-BE49-F238E27FC236}">
-                <a16:creationId xmlns:a16="http://schemas.microsoft.com/office/drawing/2014/main" id="{B13320EC-0F8F-4E5B-AE45-1ED4B3FD8796}"/>
+                <a16:creationId xmlns:a16="http://schemas.microsoft.com/office/drawing/2014/main" xmlns="" id="{B13320EC-0F8F-4E5B-AE45-1ED4B3FD8796}"/>
               </a:ext>
             </a:extLst>
           </p:cNvPr>
@@ -6378,7 +6653,7 @@
           <p:cNvPr id="17" name="Retângulo 16">
             <a:extLst>
               <a:ext uri="{FF2B5EF4-FFF2-40B4-BE49-F238E27FC236}">
-                <a16:creationId xmlns:a16="http://schemas.microsoft.com/office/drawing/2014/main" id="{B9B206CE-0C9B-45C3-B2B4-5C8EE57BD0E1}"/>
+                <a16:creationId xmlns:a16="http://schemas.microsoft.com/office/drawing/2014/main" xmlns="" id="{B9B206CE-0C9B-45C3-B2B4-5C8EE57BD0E1}"/>
               </a:ext>
             </a:extLst>
           </p:cNvPr>
@@ -6419,7 +6694,7 @@
           <a:p>
             <a:pPr algn="ctr"/>
             <a:r>
-              <a:rPr lang="pt-BR" dirty="0">
+              <a:rPr lang="pt-BR" sz="2400" dirty="0">
                 <a:solidFill>
                   <a:schemeClr val="tx1"/>
                 </a:solidFill>
@@ -6428,7 +6703,7 @@
               <a:t>Assim, através da </a:t>
             </a:r>
             <a:r>
-              <a:rPr lang="pt-BR" err="1">
+              <a:rPr lang="pt-BR" sz="2400" dirty="0" err="1">
                 <a:solidFill>
                   <a:schemeClr val="tx1"/>
                 </a:solidFill>
@@ -6437,24 +6712,42 @@
               <a:t>KPRunnin</a:t>
             </a:r>
             <a:r>
-              <a:rPr lang="pt-BR" dirty="0">
+              <a:rPr lang="pt-BR" sz="2400" dirty="0">
                 <a:solidFill>
                   <a:schemeClr val="tx1"/>
                 </a:solidFill>
                 <a:cs typeface="Calibri"/>
               </a:rPr>
-              <a:t>' é possível fazer com que o seu comércio continue executando e consiga avisar os </a:t>
-            </a:r>
-            <a:r>
-              <a:rPr lang="pt-BR">
+              <a:t>' é possível fazer com que </a:t>
+            </a:r>
+            <a:r>
+              <a:rPr lang="pt-BR" sz="2400" dirty="0" smtClean="0">
                 <a:solidFill>
                   <a:schemeClr val="tx1"/>
                 </a:solidFill>
                 <a:cs typeface="Calibri"/>
               </a:rPr>
-              <a:t>limites durante grande demanda, diminuindo assim a chance de perdas financeiras</a:t>
-            </a:r>
-            <a:endParaRPr lang="pt-BR" dirty="0">
+              <a:t>seu </a:t>
+            </a:r>
+            <a:r>
+              <a:rPr lang="pt-BR" sz="2400" dirty="0">
+                <a:solidFill>
+                  <a:schemeClr val="tx1"/>
+                </a:solidFill>
+                <a:cs typeface="Calibri"/>
+              </a:rPr>
+              <a:t>comércio continue executando e consiga avisar os limites durante grande demanda, diminuindo assim a chance de perdas </a:t>
+            </a:r>
+            <a:r>
+              <a:rPr lang="pt-BR" sz="2400" dirty="0" smtClean="0">
+                <a:solidFill>
+                  <a:schemeClr val="tx1"/>
+                </a:solidFill>
+                <a:cs typeface="Calibri"/>
+              </a:rPr>
+              <a:t>financeiras.</a:t>
+            </a:r>
+            <a:endParaRPr lang="pt-BR" sz="2400" dirty="0">
               <a:solidFill>
                 <a:schemeClr val="tx1"/>
               </a:solidFill>
@@ -6468,7 +6761,7 @@
           <p:cNvPr id="12" name="Imagem 12">
             <a:extLst>
               <a:ext uri="{FF2B5EF4-FFF2-40B4-BE49-F238E27FC236}">
-                <a16:creationId xmlns:a16="http://schemas.microsoft.com/office/drawing/2014/main" id="{62B13955-04BA-4E4E-97D2-131D76A30DD1}"/>
+                <a16:creationId xmlns:a16="http://schemas.microsoft.com/office/drawing/2014/main" xmlns="" id="{62B13955-04BA-4E4E-97D2-131D76A30DD1}"/>
               </a:ext>
             </a:extLst>
           </p:cNvPr>
@@ -6497,7 +6790,7 @@
           <p:cNvPr id="2" name="Imagem 2" descr="Desenho de personagem de desenho animado&#10;&#10;Descrição gerada com alta confiança">
             <a:extLst>
               <a:ext uri="{FF2B5EF4-FFF2-40B4-BE49-F238E27FC236}">
-                <a16:creationId xmlns:a16="http://schemas.microsoft.com/office/drawing/2014/main" id="{1995710D-5AB8-4137-9AE6-D8F796837E79}"/>
+                <a16:creationId xmlns:a16="http://schemas.microsoft.com/office/drawing/2014/main" xmlns="" id="{1995710D-5AB8-4137-9AE6-D8F796837E79}"/>
               </a:ext>
             </a:extLst>
           </p:cNvPr>
@@ -6526,7 +6819,7 @@
           <p:cNvPr id="9" name="Imagem 4" descr="Uma imagem contendo desenho&#10;&#10;Descrição gerada com muito alta confiança">
             <a:extLst>
               <a:ext uri="{FF2B5EF4-FFF2-40B4-BE49-F238E27FC236}">
-                <a16:creationId xmlns:a16="http://schemas.microsoft.com/office/drawing/2014/main" id="{F37ECE6E-737D-40A7-A09B-7BCCD61411F2}"/>
+                <a16:creationId xmlns:a16="http://schemas.microsoft.com/office/drawing/2014/main" xmlns="" id="{F37ECE6E-737D-40A7-A09B-7BCCD61411F2}"/>
               </a:ext>
             </a:extLst>
           </p:cNvPr>
@@ -6556,7 +6849,7 @@
           <p:cNvPr id="13" name="Imagem 4" descr="Uma imagem contendo desenho&#10;&#10;Descrição gerada com muito alta confiança">
             <a:extLst>
               <a:ext uri="{FF2B5EF4-FFF2-40B4-BE49-F238E27FC236}">
-                <a16:creationId xmlns:a16="http://schemas.microsoft.com/office/drawing/2014/main" id="{EEA746F7-4CF5-48FD-8661-C83DAFAB5AFF}"/>
+                <a16:creationId xmlns:a16="http://schemas.microsoft.com/office/drawing/2014/main" xmlns="" id="{EEA746F7-4CF5-48FD-8661-C83DAFAB5AFF}"/>
               </a:ext>
             </a:extLst>
           </p:cNvPr>
@@ -6586,7 +6879,7 @@
           <p:cNvPr id="14" name="Imagem 4" descr="Uma imagem contendo desenho&#10;&#10;Descrição gerada com muito alta confiança">
             <a:extLst>
               <a:ext uri="{FF2B5EF4-FFF2-40B4-BE49-F238E27FC236}">
-                <a16:creationId xmlns:a16="http://schemas.microsoft.com/office/drawing/2014/main" id="{BB8BCBCA-F611-4F16-BC1A-08BBCAEDD465}"/>
+                <a16:creationId xmlns:a16="http://schemas.microsoft.com/office/drawing/2014/main" xmlns="" id="{BB8BCBCA-F611-4F16-BC1A-08BBCAEDD465}"/>
               </a:ext>
             </a:extLst>
           </p:cNvPr>
@@ -6616,7 +6909,7 @@
           <p:cNvPr id="10" name="Imagem 4" descr="Uma imagem contendo janela, mesa&#10;&#10;Descrição gerada com muito alta confiança">
             <a:extLst>
               <a:ext uri="{FF2B5EF4-FFF2-40B4-BE49-F238E27FC236}">
-                <a16:creationId xmlns:a16="http://schemas.microsoft.com/office/drawing/2014/main" id="{C6931451-F517-4C8E-ACAC-C00D389AC5BB}"/>
+                <a16:creationId xmlns:a16="http://schemas.microsoft.com/office/drawing/2014/main" xmlns="" id="{C6931451-F517-4C8E-ACAC-C00D389AC5BB}"/>
               </a:ext>
             </a:extLst>
           </p:cNvPr>
@@ -6645,7 +6938,7 @@
           <p:cNvPr id="11" name="Imagem 4" descr="Desenho de personagem de desenho animado&#10;&#10;Descrição gerada com alta confiança">
             <a:extLst>
               <a:ext uri="{FF2B5EF4-FFF2-40B4-BE49-F238E27FC236}">
-                <a16:creationId xmlns:a16="http://schemas.microsoft.com/office/drawing/2014/main" id="{3713123E-643E-4159-94F8-AA60D1520247}"/>
+                <a16:creationId xmlns:a16="http://schemas.microsoft.com/office/drawing/2014/main" xmlns="" id="{3713123E-643E-4159-94F8-AA60D1520247}"/>
               </a:ext>
             </a:extLst>
           </p:cNvPr>
@@ -6675,7 +6968,7 @@
           <p:cNvPr id="18" name="Imagem 4" descr="Desenho de personagem de desenho animado&#10;&#10;Descrição gerada com alta confiança">
             <a:extLst>
               <a:ext uri="{FF2B5EF4-FFF2-40B4-BE49-F238E27FC236}">
-                <a16:creationId xmlns:a16="http://schemas.microsoft.com/office/drawing/2014/main" id="{96FE580B-B857-41A3-B85F-77A2D95A4C01}"/>
+                <a16:creationId xmlns:a16="http://schemas.microsoft.com/office/drawing/2014/main" xmlns="" id="{96FE580B-B857-41A3-B85F-77A2D95A4C01}"/>
               </a:ext>
             </a:extLst>
           </p:cNvPr>
@@ -6705,7 +6998,7 @@
           <p:cNvPr id="19" name="Imagem 4" descr="Desenho de personagem de desenho animado&#10;&#10;Descrição gerada com alta confiança">
             <a:extLst>
               <a:ext uri="{FF2B5EF4-FFF2-40B4-BE49-F238E27FC236}">
-                <a16:creationId xmlns:a16="http://schemas.microsoft.com/office/drawing/2014/main" id="{7AC057E0-08DA-484D-9104-E45ECD61D428}"/>
+                <a16:creationId xmlns:a16="http://schemas.microsoft.com/office/drawing/2014/main" xmlns="" id="{7AC057E0-08DA-484D-9104-E45ECD61D428}"/>
               </a:ext>
             </a:extLst>
           </p:cNvPr>
@@ -6735,7 +7028,7 @@
           <p:cNvPr id="20" name="Imagem 4" descr="Desenho de personagem de desenho animado&#10;&#10;Descrição gerada com alta confiança">
             <a:extLst>
               <a:ext uri="{FF2B5EF4-FFF2-40B4-BE49-F238E27FC236}">
-                <a16:creationId xmlns:a16="http://schemas.microsoft.com/office/drawing/2014/main" id="{CD176C5F-347F-44C2-B48E-C273E9EEB695}"/>
+                <a16:creationId xmlns:a16="http://schemas.microsoft.com/office/drawing/2014/main" xmlns="" id="{CD176C5F-347F-44C2-B48E-C273E9EEB695}"/>
               </a:ext>
             </a:extLst>
           </p:cNvPr>
@@ -6765,7 +7058,7 @@
           <p:cNvPr id="21" name="Imagem 4" descr="Desenho de personagem de desenho animado&#10;&#10;Descrição gerada com alta confiança">
             <a:extLst>
               <a:ext uri="{FF2B5EF4-FFF2-40B4-BE49-F238E27FC236}">
-                <a16:creationId xmlns:a16="http://schemas.microsoft.com/office/drawing/2014/main" id="{3E3BD8A0-8657-48D2-9217-7984D5D13D7A}"/>
+                <a16:creationId xmlns:a16="http://schemas.microsoft.com/office/drawing/2014/main" xmlns="" id="{3E3BD8A0-8657-48D2-9217-7984D5D13D7A}"/>
               </a:ext>
             </a:extLst>
           </p:cNvPr>
@@ -6795,7 +7088,7 @@
           <p:cNvPr id="23" name="Imagem 6" descr="Desenho de personagem de desenho animado&#10;&#10;Descrição gerada com alta confiança">
             <a:extLst>
               <a:ext uri="{FF2B5EF4-FFF2-40B4-BE49-F238E27FC236}">
-                <a16:creationId xmlns:a16="http://schemas.microsoft.com/office/drawing/2014/main" id="{E7AEC1F1-257C-47D4-9CC3-F51B38663FFF}"/>
+                <a16:creationId xmlns:a16="http://schemas.microsoft.com/office/drawing/2014/main" xmlns="" id="{E7AEC1F1-257C-47D4-9CC3-F51B38663FFF}"/>
               </a:ext>
             </a:extLst>
           </p:cNvPr>
@@ -6824,7 +7117,7 @@
           <p:cNvPr id="25" name="Imagem 6" descr="Uma imagem contendo mesa, computador, desenho&#10;&#10;Descrição gerada com muito alta confiança">
             <a:extLst>
               <a:ext uri="{FF2B5EF4-FFF2-40B4-BE49-F238E27FC236}">
-                <a16:creationId xmlns:a16="http://schemas.microsoft.com/office/drawing/2014/main" id="{2A411D61-E7FB-422A-85F9-A0093B207112}"/>
+                <a16:creationId xmlns:a16="http://schemas.microsoft.com/office/drawing/2014/main" xmlns="" id="{2A411D61-E7FB-422A-85F9-A0093B207112}"/>
               </a:ext>
             </a:extLst>
           </p:cNvPr>
@@ -6854,7 +7147,7 @@
           <p:cNvPr id="29" name="Imagem 9" descr="Tela de computador com fundo branco&#10;&#10;Descrição gerada com alta confiança">
             <a:extLst>
               <a:ext uri="{FF2B5EF4-FFF2-40B4-BE49-F238E27FC236}">
-                <a16:creationId xmlns:a16="http://schemas.microsoft.com/office/drawing/2014/main" id="{97AA6CB2-7B1B-49E0-A604-14BDA3C19027}"/>
+                <a16:creationId xmlns:a16="http://schemas.microsoft.com/office/drawing/2014/main" xmlns="" id="{97AA6CB2-7B1B-49E0-A604-14BDA3C19027}"/>
               </a:ext>
             </a:extLst>
           </p:cNvPr>
@@ -6884,7 +7177,7 @@
           <p:cNvPr id="30" name="Imagem 30" descr="Desenho de personagem de desenho animado&#10;&#10;Descrição gerada com alta confiança">
             <a:extLst>
               <a:ext uri="{FF2B5EF4-FFF2-40B4-BE49-F238E27FC236}">
-                <a16:creationId xmlns:a16="http://schemas.microsoft.com/office/drawing/2014/main" id="{DA8D05B2-DE44-4101-B5A4-E4F599862C11}"/>
+                <a16:creationId xmlns:a16="http://schemas.microsoft.com/office/drawing/2014/main" xmlns="" id="{DA8D05B2-DE44-4101-B5A4-E4F599862C11}"/>
               </a:ext>
             </a:extLst>
           </p:cNvPr>
@@ -6914,7 +7207,7 @@
           <p:cNvPr id="32" name="Imagem 32" descr="Uma imagem contendo desenho&#10;&#10;Descrição gerada com muito alta confiança">
             <a:extLst>
               <a:ext uri="{FF2B5EF4-FFF2-40B4-BE49-F238E27FC236}">
-                <a16:creationId xmlns:a16="http://schemas.microsoft.com/office/drawing/2014/main" id="{0248FDEE-6878-4648-9E46-1860539B7C17}"/>
+                <a16:creationId xmlns:a16="http://schemas.microsoft.com/office/drawing/2014/main" xmlns="" id="{0248FDEE-6878-4648-9E46-1860539B7C17}"/>
               </a:ext>
             </a:extLst>
           </p:cNvPr>
@@ -6944,7 +7237,7 @@
           <p:cNvPr id="41" name="Imagem 9" descr="Tela de computador com fundo branco&#10;&#10;Descrição gerada com alta confiança">
             <a:extLst>
               <a:ext uri="{FF2B5EF4-FFF2-40B4-BE49-F238E27FC236}">
-                <a16:creationId xmlns:a16="http://schemas.microsoft.com/office/drawing/2014/main" id="{D69EC568-28AB-45F5-9870-12ADAB676724}"/>
+                <a16:creationId xmlns:a16="http://schemas.microsoft.com/office/drawing/2014/main" xmlns="" id="{D69EC568-28AB-45F5-9870-12ADAB676724}"/>
               </a:ext>
             </a:extLst>
           </p:cNvPr>
@@ -6974,7 +7267,7 @@
           <p:cNvPr id="42" name="Imagem 4" descr="Uma imagem contendo desenho&#10;&#10;Descrição gerada com muito alta confiança">
             <a:extLst>
               <a:ext uri="{FF2B5EF4-FFF2-40B4-BE49-F238E27FC236}">
-                <a16:creationId xmlns:a16="http://schemas.microsoft.com/office/drawing/2014/main" id="{8BBA1854-9935-40A7-9FEE-5F1FA04794CB}"/>
+                <a16:creationId xmlns:a16="http://schemas.microsoft.com/office/drawing/2014/main" xmlns="" id="{8BBA1854-9935-40A7-9FEE-5F1FA04794CB}"/>
               </a:ext>
             </a:extLst>
           </p:cNvPr>
@@ -7004,7 +7297,7 @@
           <p:cNvPr id="43" name="Imagem 4" descr="Uma imagem contendo desenho&#10;&#10;Descrição gerada com muito alta confiança">
             <a:extLst>
               <a:ext uri="{FF2B5EF4-FFF2-40B4-BE49-F238E27FC236}">
-                <a16:creationId xmlns:a16="http://schemas.microsoft.com/office/drawing/2014/main" id="{845BD31D-337C-49C0-A12C-31160A3BE48D}"/>
+                <a16:creationId xmlns:a16="http://schemas.microsoft.com/office/drawing/2014/main" xmlns="" id="{845BD31D-337C-49C0-A12C-31160A3BE48D}"/>
               </a:ext>
             </a:extLst>
           </p:cNvPr>
@@ -7034,7 +7327,7 @@
           <p:cNvPr id="44" name="Imagem 4" descr="Uma imagem contendo desenho&#10;&#10;Descrição gerada com muito alta confiança">
             <a:extLst>
               <a:ext uri="{FF2B5EF4-FFF2-40B4-BE49-F238E27FC236}">
-                <a16:creationId xmlns:a16="http://schemas.microsoft.com/office/drawing/2014/main" id="{E61B5B40-C58C-4D6B-933B-DF072D1E7820}"/>
+                <a16:creationId xmlns:a16="http://schemas.microsoft.com/office/drawing/2014/main" xmlns="" id="{E61B5B40-C58C-4D6B-933B-DF072D1E7820}"/>
               </a:ext>
             </a:extLst>
           </p:cNvPr>
@@ -7064,7 +7357,7 @@
           <p:cNvPr id="31" name="Imagem 30">
             <a:extLst>
               <a:ext uri="{FF2B5EF4-FFF2-40B4-BE49-F238E27FC236}">
-                <a16:creationId xmlns:a16="http://schemas.microsoft.com/office/drawing/2014/main" id="{2F38D2C9-B03B-44AB-BA56-26383EAEC0B4}"/>
+                <a16:creationId xmlns:a16="http://schemas.microsoft.com/office/drawing/2014/main" xmlns="" id="{2F38D2C9-B03B-44AB-BA56-26383EAEC0B4}"/>
               </a:ext>
             </a:extLst>
           </p:cNvPr>
@@ -7100,7 +7393,7 @@
           <p:cNvPr id="33" name="Imagem 32">
             <a:extLst>
               <a:ext uri="{FF2B5EF4-FFF2-40B4-BE49-F238E27FC236}">
-                <a16:creationId xmlns:a16="http://schemas.microsoft.com/office/drawing/2014/main" id="{D98A2357-5484-45A9-BABE-0D1CFE27057C}"/>
+                <a16:creationId xmlns:a16="http://schemas.microsoft.com/office/drawing/2014/main" xmlns="" id="{D98A2357-5484-45A9-BABE-0D1CFE27057C}"/>
               </a:ext>
             </a:extLst>
           </p:cNvPr>

</xml_diff>